<commit_message>
Week 10 slides added
</commit_message>
<xml_diff>
--- a/slides/cds431_week10.pptx
+++ b/slides/cds431_week10.pptx
@@ -5,7 +5,7 @@
     <p:sldMasterId id="2147483648" r:id="rId1"/>
   </p:sldMasterIdLst>
   <p:notesMasterIdLst>
-    <p:notesMasterId r:id="rId24"/>
+    <p:notesMasterId r:id="rId13"/>
   </p:notesMasterIdLst>
   <p:sldIdLst>
     <p:sldId id="380" r:id="rId2"/>
@@ -17,19 +17,8 @@
     <p:sldId id="563" r:id="rId8"/>
     <p:sldId id="587" r:id="rId9"/>
     <p:sldId id="588" r:id="rId10"/>
-    <p:sldId id="605" r:id="rId11"/>
-    <p:sldId id="589" r:id="rId12"/>
-    <p:sldId id="590" r:id="rId13"/>
-    <p:sldId id="591" r:id="rId14"/>
-    <p:sldId id="592" r:id="rId15"/>
-    <p:sldId id="593" r:id="rId16"/>
-    <p:sldId id="594" r:id="rId17"/>
-    <p:sldId id="595" r:id="rId18"/>
-    <p:sldId id="597" r:id="rId19"/>
-    <p:sldId id="603" r:id="rId20"/>
-    <p:sldId id="604" r:id="rId21"/>
-    <p:sldId id="596" r:id="rId22"/>
-    <p:sldId id="449" r:id="rId23"/>
+    <p:sldId id="596" r:id="rId11"/>
+    <p:sldId id="449" r:id="rId12"/>
   </p:sldIdLst>
   <p:sldSz cx="12192000" cy="6858000"/>
   <p:notesSz cx="6858000" cy="9144000"/>
@@ -128,6 +117,11 @@
       </a:defRPr>
     </a:lvl9pPr>
   </p:defaultTextStyle>
+  <p:extLst>
+    <p:ext uri="{EFAFB233-063F-42B5-8137-9DF3F51BA10A}">
+      <p15:sldGuideLst xmlns:p15="http://schemas.microsoft.com/office/powerpoint/2012/main"/>
+    </p:ext>
+  </p:extLst>
 </p:presentation>
 </file>
 
@@ -1167,12 +1161,12 @@
         <a:fontRef idx="minor"/>
       </dsp:style>
       <dsp:txBody>
-        <a:bodyPr spcFirstLastPara="0" vert="horz" wrap="square" lIns="30480" tIns="30480" rIns="30480" bIns="30480" numCol="1" spcCol="1270" anchor="ctr" anchorCtr="0">
+        <a:bodyPr spcFirstLastPara="0" vert="horz" wrap="square" lIns="31750" tIns="31750" rIns="31750" bIns="31750" numCol="1" spcCol="1270" anchor="ctr" anchorCtr="0">
           <a:noAutofit/>
         </a:bodyPr>
         <a:lstStyle/>
         <a:p>
-          <a:pPr marL="0" lvl="0" indent="0" algn="ctr" defTabSz="1066800">
+          <a:pPr marL="0" lvl="0" indent="0" algn="ctr" defTabSz="1111250">
             <a:lnSpc>
               <a:spcPct val="90000"/>
             </a:lnSpc>
@@ -1185,7 +1179,7 @@
             <a:buNone/>
           </a:pPr>
           <a:r>
-            <a:rPr lang="en-US" sz="2400" b="1" kern="1200"/>
+            <a:rPr lang="en-US" sz="2500" b="1" kern="1200"/>
             <a:t>Assessment</a:t>
           </a:r>
         </a:p>
@@ -1304,12 +1298,12 @@
         <a:fontRef idx="minor"/>
       </dsp:style>
       <dsp:txBody>
-        <a:bodyPr spcFirstLastPara="0" vert="horz" wrap="square" lIns="30480" tIns="30480" rIns="30480" bIns="30480" numCol="1" spcCol="1270" anchor="ctr" anchorCtr="0">
+        <a:bodyPr spcFirstLastPara="0" vert="horz" wrap="square" lIns="31750" tIns="31750" rIns="31750" bIns="31750" numCol="1" spcCol="1270" anchor="ctr" anchorCtr="0">
           <a:noAutofit/>
         </a:bodyPr>
         <a:lstStyle/>
         <a:p>
-          <a:pPr marL="0" lvl="0" indent="0" algn="ctr" defTabSz="1066800">
+          <a:pPr marL="0" lvl="0" indent="0" algn="ctr" defTabSz="1111250">
             <a:lnSpc>
               <a:spcPct val="90000"/>
             </a:lnSpc>
@@ -1322,7 +1316,7 @@
             <a:buNone/>
           </a:pPr>
           <a:r>
-            <a:rPr lang="en-US" sz="2400" b="1" kern="1200"/>
+            <a:rPr lang="en-US" sz="2500" b="1" kern="1200"/>
             <a:t>Treatment Planning</a:t>
           </a:r>
         </a:p>
@@ -1441,12 +1435,12 @@
         <a:fontRef idx="minor"/>
       </dsp:style>
       <dsp:txBody>
-        <a:bodyPr spcFirstLastPara="0" vert="horz" wrap="square" lIns="30480" tIns="30480" rIns="30480" bIns="30480" numCol="1" spcCol="1270" anchor="ctr" anchorCtr="0">
+        <a:bodyPr spcFirstLastPara="0" vert="horz" wrap="square" lIns="31750" tIns="31750" rIns="31750" bIns="31750" numCol="1" spcCol="1270" anchor="ctr" anchorCtr="0">
           <a:noAutofit/>
         </a:bodyPr>
         <a:lstStyle/>
         <a:p>
-          <a:pPr marL="0" lvl="0" indent="0" algn="ctr" defTabSz="1066800">
+          <a:pPr marL="0" lvl="0" indent="0" algn="ctr" defTabSz="1111250">
             <a:lnSpc>
               <a:spcPct val="90000"/>
             </a:lnSpc>
@@ -1459,7 +1453,7 @@
             <a:buNone/>
           </a:pPr>
           <a:r>
-            <a:rPr lang="en-US" sz="2400" b="1" kern="1200"/>
+            <a:rPr lang="en-US" sz="2500" b="1" kern="1200"/>
             <a:t>Treatment</a:t>
           </a:r>
         </a:p>
@@ -2864,7 +2858,7 @@
           <a:p>
             <a:fld id="{39E584BE-5390-AA4C-B4A2-5FA2E3B5D225}" type="datetimeFigureOut">
               <a:rPr lang="en-US" smtClean="0"/>
-              <a:t>1/10/22</a:t>
+              <a:t>6/1/22</a:t>
             </a:fld>
             <a:endParaRPr lang="en-US"/>
           </a:p>
@@ -3383,90 +3377,6 @@
 </p:notes>
 </file>
 
-<file path=ppt/notesSlides/notesSlide4.xml><?xml version="1.0" encoding="utf-8"?>
-<p:notes xmlns:a="http://schemas.openxmlformats.org/drawingml/2006/main" xmlns:r="http://schemas.openxmlformats.org/officeDocument/2006/relationships" xmlns:p="http://schemas.openxmlformats.org/presentationml/2006/main">
-  <p:cSld>
-    <p:spTree>
-      <p:nvGrpSpPr>
-        <p:cNvPr id="1" name=""/>
-        <p:cNvGrpSpPr/>
-        <p:nvPr/>
-      </p:nvGrpSpPr>
-      <p:grpSpPr>
-        <a:xfrm>
-          <a:off x="0" y="0"/>
-          <a:ext cx="0" cy="0"/>
-          <a:chOff x="0" y="0"/>
-          <a:chExt cx="0" cy="0"/>
-        </a:xfrm>
-      </p:grpSpPr>
-      <p:sp>
-        <p:nvSpPr>
-          <p:cNvPr id="2" name="Slide Image Placeholder 1"/>
-          <p:cNvSpPr>
-            <a:spLocks noGrp="1" noRot="1" noChangeAspect="1"/>
-          </p:cNvSpPr>
-          <p:nvPr>
-            <p:ph type="sldImg"/>
-          </p:nvPr>
-        </p:nvSpPr>
-        <p:spPr/>
-      </p:sp>
-      <p:sp>
-        <p:nvSpPr>
-          <p:cNvPr id="3" name="Notes Placeholder 2"/>
-          <p:cNvSpPr>
-            <a:spLocks noGrp="1"/>
-          </p:cNvSpPr>
-          <p:nvPr>
-            <p:ph type="body" idx="1"/>
-          </p:nvPr>
-        </p:nvSpPr>
-        <p:spPr/>
-        <p:txBody>
-          <a:bodyPr/>
-          <a:lstStyle/>
-          <a:p>
-            <a:endParaRPr lang="en-US" dirty="0"/>
-          </a:p>
-        </p:txBody>
-      </p:sp>
-      <p:sp>
-        <p:nvSpPr>
-          <p:cNvPr id="4" name="Slide Number Placeholder 3"/>
-          <p:cNvSpPr>
-            <a:spLocks noGrp="1"/>
-          </p:cNvSpPr>
-          <p:nvPr>
-            <p:ph type="sldNum" sz="quarter" idx="5"/>
-          </p:nvPr>
-        </p:nvSpPr>
-        <p:spPr/>
-        <p:txBody>
-          <a:bodyPr/>
-          <a:lstStyle/>
-          <a:p>
-            <a:fld id="{AA0A589D-B577-494C-AEB5-A5D4F1908003}" type="slidenum">
-              <a:rPr lang="en-US" smtClean="0"/>
-              <a:t>16</a:t>
-            </a:fld>
-            <a:endParaRPr lang="en-US"/>
-          </a:p>
-        </p:txBody>
-      </p:sp>
-    </p:spTree>
-    <p:extLst>
-      <p:ext uri="{BB962C8B-B14F-4D97-AF65-F5344CB8AC3E}">
-        <p14:creationId xmlns:p14="http://schemas.microsoft.com/office/powerpoint/2010/main" val="840510286"/>
-      </p:ext>
-    </p:extLst>
-  </p:cSld>
-  <p:clrMapOvr>
-    <a:masterClrMapping/>
-  </p:clrMapOvr>
-</p:notes>
-</file>
-
 <file path=ppt/slideLayouts/slideLayout1.xml><?xml version="1.0" encoding="utf-8"?>
 <p:sldLayout xmlns:a="http://schemas.openxmlformats.org/drawingml/2006/main" xmlns:r="http://schemas.openxmlformats.org/officeDocument/2006/relationships" xmlns:p="http://schemas.openxmlformats.org/presentationml/2006/main" type="title" preserve="1">
   <p:cSld name="Title Slide">
@@ -3614,7 +3524,7 @@
           <a:p>
             <a:fld id="{F9C66D62-EDD3-B043-8E77-6D2715CC2E5B}" type="datetimeFigureOut">
               <a:rPr lang="en-US" smtClean="0"/>
-              <a:t>1/10/22</a:t>
+              <a:t>6/1/22</a:t>
             </a:fld>
             <a:endParaRPr lang="en-US"/>
           </a:p>
@@ -3812,7 +3722,7 @@
           <a:p>
             <a:fld id="{F9C66D62-EDD3-B043-8E77-6D2715CC2E5B}" type="datetimeFigureOut">
               <a:rPr lang="en-US" smtClean="0"/>
-              <a:t>1/10/22</a:t>
+              <a:t>6/1/22</a:t>
             </a:fld>
             <a:endParaRPr lang="en-US"/>
           </a:p>
@@ -4020,7 +3930,7 @@
           <a:p>
             <a:fld id="{F9C66D62-EDD3-B043-8E77-6D2715CC2E5B}" type="datetimeFigureOut">
               <a:rPr lang="en-US" smtClean="0"/>
-              <a:t>1/10/22</a:t>
+              <a:t>6/1/22</a:t>
             </a:fld>
             <a:endParaRPr lang="en-US"/>
           </a:p>
@@ -4218,7 +4128,7 @@
           <a:p>
             <a:fld id="{F9C66D62-EDD3-B043-8E77-6D2715CC2E5B}" type="datetimeFigureOut">
               <a:rPr lang="en-US" smtClean="0"/>
-              <a:t>1/10/22</a:t>
+              <a:t>6/1/22</a:t>
             </a:fld>
             <a:endParaRPr lang="en-US"/>
           </a:p>
@@ -4493,7 +4403,7 @@
           <a:p>
             <a:fld id="{F9C66D62-EDD3-B043-8E77-6D2715CC2E5B}" type="datetimeFigureOut">
               <a:rPr lang="en-US" smtClean="0"/>
-              <a:t>1/10/22</a:t>
+              <a:t>6/1/22</a:t>
             </a:fld>
             <a:endParaRPr lang="en-US"/>
           </a:p>
@@ -4758,7 +4668,7 @@
           <a:p>
             <a:fld id="{F9C66D62-EDD3-B043-8E77-6D2715CC2E5B}" type="datetimeFigureOut">
               <a:rPr lang="en-US" smtClean="0"/>
-              <a:t>1/10/22</a:t>
+              <a:t>6/1/22</a:t>
             </a:fld>
             <a:endParaRPr lang="en-US"/>
           </a:p>
@@ -5170,7 +5080,7 @@
           <a:p>
             <a:fld id="{F9C66D62-EDD3-B043-8E77-6D2715CC2E5B}" type="datetimeFigureOut">
               <a:rPr lang="en-US" smtClean="0"/>
-              <a:t>1/10/22</a:t>
+              <a:t>6/1/22</a:t>
             </a:fld>
             <a:endParaRPr lang="en-US"/>
           </a:p>
@@ -5311,7 +5221,7 @@
           <a:p>
             <a:fld id="{F9C66D62-EDD3-B043-8E77-6D2715CC2E5B}" type="datetimeFigureOut">
               <a:rPr lang="en-US" smtClean="0"/>
-              <a:t>1/10/22</a:t>
+              <a:t>6/1/22</a:t>
             </a:fld>
             <a:endParaRPr lang="en-US"/>
           </a:p>
@@ -5424,7 +5334,7 @@
           <a:p>
             <a:fld id="{F9C66D62-EDD3-B043-8E77-6D2715CC2E5B}" type="datetimeFigureOut">
               <a:rPr lang="en-US" smtClean="0"/>
-              <a:t>1/10/22</a:t>
+              <a:t>6/1/22</a:t>
             </a:fld>
             <a:endParaRPr lang="en-US"/>
           </a:p>
@@ -5735,7 +5645,7 @@
           <a:p>
             <a:fld id="{F9C66D62-EDD3-B043-8E77-6D2715CC2E5B}" type="datetimeFigureOut">
               <a:rPr lang="en-US" smtClean="0"/>
-              <a:t>1/10/22</a:t>
+              <a:t>6/1/22</a:t>
             </a:fld>
             <a:endParaRPr lang="en-US"/>
           </a:p>
@@ -6023,7 +5933,7 @@
           <a:p>
             <a:fld id="{F9C66D62-EDD3-B043-8E77-6D2715CC2E5B}" type="datetimeFigureOut">
               <a:rPr lang="en-US" smtClean="0"/>
-              <a:t>1/10/22</a:t>
+              <a:t>6/1/22</a:t>
             </a:fld>
             <a:endParaRPr lang="en-US"/>
           </a:p>
@@ -6294,7 +6204,7 @@
           <a:p>
             <a:fld id="{F9C66D62-EDD3-B043-8E77-6D2715CC2E5B}" type="datetimeFigureOut">
               <a:rPr lang="en-US" smtClean="0"/>
-              <a:t>1/10/22</a:t>
+              <a:t>6/1/22</a:t>
             </a:fld>
             <a:endParaRPr lang="en-US"/>
           </a:p>
@@ -6915,7 +6825,7 @@
           <p:cNvPr id="2" name="Title 1">
             <a:extLst>
               <a:ext uri="{FF2B5EF4-FFF2-40B4-BE49-F238E27FC236}">
-                <a16:creationId xmlns:a16="http://schemas.microsoft.com/office/drawing/2014/main" id="{AF546463-F79B-D242-8F2E-12BEAE91EA3C}"/>
+                <a16:creationId xmlns:a16="http://schemas.microsoft.com/office/drawing/2014/main" id="{AEF46171-66FE-9B40-9B31-9678F6129C82}"/>
               </a:ext>
             </a:extLst>
           </p:cNvPr>
@@ -6923,34 +6833,27 @@
             <a:spLocks noGrp="1"/>
           </p:cNvSpPr>
           <p:nvPr>
-            <p:ph type="ctrTitle"/>
+            <p:ph type="title"/>
           </p:nvPr>
         </p:nvSpPr>
-        <p:spPr>
-          <a:xfrm>
-            <a:off x="2781300" y="207963"/>
-            <a:ext cx="6858000" cy="2387600"/>
-          </a:xfrm>
-        </p:spPr>
+        <p:spPr/>
         <p:txBody>
           <a:bodyPr/>
           <a:lstStyle/>
           <a:p>
             <a:r>
-              <a:rPr lang="en-US" dirty="0">
-                <a:latin typeface="KG Miss Kindergarten" panose="02000000000000000000" pitchFamily="2" charset="77"/>
-              </a:rPr>
-              <a:t>What’s wrong with this scenario?</a:t>
-            </a:r>
-          </a:p>
-        </p:txBody>
-      </p:sp>
-      <p:sp>
-        <p:nvSpPr>
-          <p:cNvPr id="3" name="Subtitle 2">
+              <a:rPr lang="en-US" dirty="0"/>
+              <a:t>WHAT MATTERS IN THERAPY?</a:t>
+            </a:r>
+          </a:p>
+        </p:txBody>
+      </p:sp>
+      <p:sp>
+        <p:nvSpPr>
+          <p:cNvPr id="3" name="Content Placeholder 2">
             <a:extLst>
               <a:ext uri="{FF2B5EF4-FFF2-40B4-BE49-F238E27FC236}">
-                <a16:creationId xmlns:a16="http://schemas.microsoft.com/office/drawing/2014/main" id="{F6AC8F2E-938D-234B-B359-EB1BC6A8F335}"/>
+                <a16:creationId xmlns:a16="http://schemas.microsoft.com/office/drawing/2014/main" id="{B402E7D0-538B-4448-B0A2-716637C63E0E}"/>
               </a:ext>
             </a:extLst>
           </p:cNvPr>
@@ -6958,100 +6861,140 @@
             <a:spLocks noGrp="1"/>
           </p:cNvSpPr>
           <p:nvPr>
-            <p:ph type="subTitle" idx="1"/>
+            <p:ph idx="1"/>
           </p:nvPr>
         </p:nvSpPr>
         <p:spPr>
           <a:xfrm>
-            <a:off x="2667000" y="3098800"/>
-            <a:ext cx="6858000" cy="660400"/>
+            <a:off x="2152650" y="1463885"/>
+            <a:ext cx="7886700" cy="5117785"/>
           </a:xfrm>
         </p:spPr>
         <p:txBody>
           <a:bodyPr>
-            <a:normAutofit/>
+            <a:normAutofit fontScale="92500" lnSpcReduction="20000"/>
           </a:bodyPr>
           <a:lstStyle/>
           <a:p>
-            <a:r>
-              <a:rPr lang="en-US" sz="3200" dirty="0">
-                <a:latin typeface="KG Miss Kindergarten" panose="02000000000000000000" pitchFamily="2" charset="77"/>
+            <a:pPr>
+              <a:lnSpc>
+                <a:spcPct val="150000"/>
+              </a:lnSpc>
+              <a:buFont typeface="Wingdings" pitchFamily="2" charset="2"/>
+              <a:buChar char="Ø"/>
+            </a:pPr>
+            <a:r>
+              <a:rPr lang="en-US" dirty="0"/>
+              <a:t>CLEAR EXPECTATIONS (behavior and targets)</a:t>
+            </a:r>
+          </a:p>
+          <a:p>
+            <a:pPr>
+              <a:lnSpc>
+                <a:spcPct val="150000"/>
+              </a:lnSpc>
+              <a:buFont typeface="Wingdings" pitchFamily="2" charset="2"/>
+              <a:buChar char="Ø"/>
+            </a:pPr>
+            <a:r>
+              <a:rPr lang="en-US" dirty="0"/>
+              <a:t>FUNCTIONAL, MOTIVATING TASKS</a:t>
+            </a:r>
+          </a:p>
+          <a:p>
+            <a:pPr>
+              <a:lnSpc>
+                <a:spcPct val="150000"/>
+              </a:lnSpc>
+              <a:buFont typeface="Wingdings" pitchFamily="2" charset="2"/>
+              <a:buChar char="Ø"/>
+            </a:pPr>
+            <a:r>
+              <a:rPr lang="en-US" dirty="0"/>
+              <a:t>CHALLENGING TARGETS:  not too easy, not too hard</a:t>
+            </a:r>
+          </a:p>
+          <a:p>
+            <a:pPr>
+              <a:lnSpc>
+                <a:spcPct val="150000"/>
+              </a:lnSpc>
+              <a:buFont typeface="Wingdings" pitchFamily="2" charset="2"/>
+              <a:buChar char="Ø"/>
+            </a:pPr>
+            <a:r>
+              <a:rPr lang="en-US" dirty="0"/>
+              <a:t>REINFORCERS AND REINFORCEMENT SCHEDULE</a:t>
+            </a:r>
+          </a:p>
+          <a:p>
+            <a:pPr>
+              <a:lnSpc>
+                <a:spcPct val="150000"/>
+              </a:lnSpc>
+              <a:buFont typeface="Wingdings" pitchFamily="2" charset="2"/>
+              <a:buChar char="Ø"/>
+            </a:pPr>
+            <a:r>
+              <a:rPr lang="en-US" dirty="0"/>
+              <a:t>PACING:  MINUTES MATTER</a:t>
+            </a:r>
+          </a:p>
+          <a:p>
+            <a:pPr>
+              <a:lnSpc>
+                <a:spcPct val="150000"/>
+              </a:lnSpc>
+              <a:buFont typeface="Wingdings" pitchFamily="2" charset="2"/>
+              <a:buChar char="Ø"/>
+            </a:pPr>
+            <a:r>
+              <a:rPr lang="en-US" dirty="0"/>
+              <a:t>CLEAR INSTRUCTIONAL LANGUAGE</a:t>
+            </a:r>
+          </a:p>
+          <a:p>
+            <a:pPr>
+              <a:lnSpc>
+                <a:spcPct val="150000"/>
+              </a:lnSpc>
+              <a:buFont typeface="Wingdings" pitchFamily="2" charset="2"/>
+              <a:buChar char="Ø"/>
+            </a:pPr>
+            <a:r>
+              <a:rPr lang="en-US" dirty="0"/>
+              <a:t>SPECIFIC CORRECTIVE FEEDBACK</a:t>
+            </a:r>
+          </a:p>
+          <a:p>
+            <a:pPr>
+              <a:lnSpc>
+                <a:spcPct val="150000"/>
+              </a:lnSpc>
+              <a:buFont typeface="Wingdings" pitchFamily="2" charset="2"/>
+              <a:buChar char="Ø"/>
+            </a:pPr>
+            <a:r>
+              <a:rPr lang="en-US" b="1" dirty="0">
+                <a:solidFill>
+                  <a:srgbClr val="FF40FF"/>
+                </a:solidFill>
               </a:rPr>
-              <a:t>Troubleshooting Therapy</a:t>
-            </a:r>
-          </a:p>
-        </p:txBody>
-      </p:sp>
-      <p:sp>
-        <p:nvSpPr>
-          <p:cNvPr id="4" name="TextBox 3">
-            <a:extLst>
-              <a:ext uri="{FF2B5EF4-FFF2-40B4-BE49-F238E27FC236}">
-                <a16:creationId xmlns:a16="http://schemas.microsoft.com/office/drawing/2014/main" id="{52B868E7-D339-2943-A0E7-3EF54DDD3AC5}"/>
-              </a:ext>
-            </a:extLst>
-          </p:cNvPr>
-          <p:cNvSpPr txBox="1"/>
-          <p:nvPr/>
-        </p:nvSpPr>
-        <p:spPr>
-          <a:xfrm>
-            <a:off x="1695451" y="4181474"/>
-            <a:ext cx="8743950" cy="1569660"/>
-          </a:xfrm>
-          <a:prstGeom prst="rect">
-            <a:avLst/>
-          </a:prstGeom>
-          <a:noFill/>
-        </p:spPr>
-        <p:txBody>
-          <a:bodyPr wrap="square" rtlCol="0">
-            <a:spAutoFit/>
-          </a:bodyPr>
-          <a:lstStyle/>
-          <a:p>
-            <a:r>
-              <a:rPr lang="en-US" sz="3200" dirty="0">
-                <a:latin typeface="KG Miss Kindergarten" panose="02000000000000000000" pitchFamily="2" charset="77"/>
-              </a:rPr>
-              <a:t>Go to </a:t>
-            </a:r>
-            <a:r>
-              <a:rPr lang="en-US" sz="3200" dirty="0">
-                <a:latin typeface="KG Miss Kindergarten" panose="02000000000000000000" pitchFamily="2" charset="77"/>
-                <a:hlinkClick r:id="rId2">
-                  <a:extLst>
-                    <a:ext uri="{A12FA001-AC4F-418D-AE19-62706E023703}">
-                      <ahyp:hlinkClr xmlns:ahyp="http://schemas.microsoft.com/office/drawing/2018/hyperlinkcolor" val="tx"/>
-                    </a:ext>
-                  </a:extLst>
-                </a:hlinkClick>
-              </a:rPr>
-              <a:t>https://tinyurl.com/CDS431-Therapy</a:t>
-            </a:r>
-            <a:endParaRPr lang="en-US" sz="3200" dirty="0">
-              <a:latin typeface="KG Miss Kindergarten" panose="02000000000000000000" pitchFamily="2" charset="77"/>
-            </a:endParaRPr>
-          </a:p>
-          <a:p>
-            <a:endParaRPr lang="en-US" sz="3200" dirty="0">
-              <a:latin typeface="KG Miss Kindergarten" panose="02000000000000000000" pitchFamily="2" charset="77"/>
-            </a:endParaRPr>
-          </a:p>
-          <a:p>
-            <a:r>
-              <a:rPr lang="en-US" sz="3200" dirty="0">
-                <a:latin typeface="KG Miss Kindergarten" panose="02000000000000000000" pitchFamily="2" charset="77"/>
-              </a:rPr>
-              <a:t>Designate a scribe/reporter for each scenario.</a:t>
-            </a:r>
+              <a:t>EMPATHY, CONNECTION, ENTHUSIASM</a:t>
+            </a:r>
+          </a:p>
+          <a:p>
+            <a:pPr marL="0" indent="0">
+              <a:buNone/>
+            </a:pPr>
+            <a:endParaRPr lang="en-US" dirty="0"/>
           </a:p>
         </p:txBody>
       </p:sp>
     </p:spTree>
     <p:extLst>
       <p:ext uri="{BB962C8B-B14F-4D97-AF65-F5344CB8AC3E}">
-        <p14:creationId xmlns:p14="http://schemas.microsoft.com/office/powerpoint/2010/main" val="2180054398"/>
+        <p14:creationId xmlns:p14="http://schemas.microsoft.com/office/powerpoint/2010/main" val="1514819745"/>
       </p:ext>
     </p:extLst>
   </p:cSld>
@@ -7078,55 +7021,36 @@
           <a:chExt cx="0" cy="0"/>
         </a:xfrm>
       </p:grpSpPr>
-      <p:sp>
-        <p:nvSpPr>
-          <p:cNvPr id="2" name="Title 1">
-            <a:extLst>
-              <a:ext uri="{FF2B5EF4-FFF2-40B4-BE49-F238E27FC236}">
-                <a16:creationId xmlns:a16="http://schemas.microsoft.com/office/drawing/2014/main" id="{5D9BF388-2F3D-DF4A-AB27-7EC7C2904857}"/>
-              </a:ext>
-            </a:extLst>
-          </p:cNvPr>
-          <p:cNvSpPr>
-            <a:spLocks noGrp="1"/>
-          </p:cNvSpPr>
+      <p:graphicFrame>
+        <p:nvGraphicFramePr>
+          <p:cNvPr id="6" name="Content Placeholder 5"/>
+          <p:cNvGraphicFramePr>
+            <a:graphicFrameLocks noGrp="1"/>
+          </p:cNvGraphicFramePr>
           <p:nvPr>
-            <p:ph type="title"/>
+            <p:ph idx="1"/>
           </p:nvPr>
+        </p:nvGraphicFramePr>
+        <p:xfrm>
+          <a:off x="2152650" y="1825625"/>
+          <a:ext cx="7886700" cy="4351338"/>
+        </p:xfrm>
+        <a:graphic>
+          <a:graphicData uri="http://schemas.openxmlformats.org/drawingml/2006/diagram">
+            <dgm:relIds xmlns:dgm="http://schemas.openxmlformats.org/drawingml/2006/diagram" xmlns:r="http://schemas.openxmlformats.org/officeDocument/2006/relationships" r:dm="rId2" r:lo="rId3" r:qs="rId4" r:cs="rId5"/>
+          </a:graphicData>
+        </a:graphic>
+      </p:graphicFrame>
+      <p:sp>
+        <p:nvSpPr>
+          <p:cNvPr id="7" name="TextBox 6"/>
+          <p:cNvSpPr txBox="1"/>
+          <p:nvPr/>
         </p:nvSpPr>
         <p:spPr>
           <a:xfrm>
-            <a:off x="2152650" y="365127"/>
-            <a:ext cx="7886700" cy="1006474"/>
-          </a:xfrm>
-        </p:spPr>
-        <p:txBody>
-          <a:bodyPr/>
-          <a:lstStyle/>
-          <a:p>
-            <a:r>
-              <a:rPr lang="en-US" dirty="0"/>
-              <a:t>Troubleshooting Therapy</a:t>
-            </a:r>
-          </a:p>
-        </p:txBody>
-      </p:sp>
-      <p:sp>
-        <p:nvSpPr>
-          <p:cNvPr id="3" name="TextBox 2">
-            <a:extLst>
-              <a:ext uri="{FF2B5EF4-FFF2-40B4-BE49-F238E27FC236}">
-                <a16:creationId xmlns:a16="http://schemas.microsoft.com/office/drawing/2014/main" id="{05A856DE-DA91-8141-8A65-C4411A48A9F5}"/>
-              </a:ext>
-            </a:extLst>
-          </p:cNvPr>
-          <p:cNvSpPr txBox="1"/>
-          <p:nvPr/>
-        </p:nvSpPr>
-        <p:spPr>
-          <a:xfrm>
-            <a:off x="1924051" y="1394916"/>
-            <a:ext cx="8218170" cy="5262979"/>
+            <a:off x="2613025" y="356462"/>
+            <a:ext cx="7481538" cy="984885"/>
           </a:xfrm>
           <a:prstGeom prst="rect">
             <a:avLst/>
@@ -7139,125 +7063,33 @@
           </a:bodyPr>
           <a:lstStyle/>
           <a:p>
-            <a:r>
-              <a:rPr lang="en-US" sz="2800" dirty="0"/>
-              <a:t>Scenarios:</a:t>
-            </a:r>
-          </a:p>
-          <a:p>
-            <a:endParaRPr lang="en-US" sz="2800" dirty="0"/>
-          </a:p>
-          <a:p>
-            <a:r>
-              <a:rPr lang="en-US" sz="2800" dirty="0"/>
-              <a:t>4-year-old child with ASD is running around your therapy room and you can’t engage him.  (Group 1)</a:t>
-            </a:r>
-          </a:p>
-          <a:p>
-            <a:endParaRPr lang="en-US" sz="2800" dirty="0"/>
-          </a:p>
-          <a:p>
-            <a:r>
-              <a:rPr lang="en-US" sz="2800" dirty="0"/>
-              <a:t>Teenage client has not attended the last 3 sessions. (Group 2)</a:t>
-            </a:r>
-          </a:p>
-          <a:p>
-            <a:endParaRPr lang="en-US" sz="2800" dirty="0"/>
-          </a:p>
-          <a:p>
-            <a:r>
-              <a:rPr lang="en-US" sz="2800" dirty="0"/>
-              <a:t>Adult client with ALS has cancelled two appointments for an AAC evaluation and voice banking. (Group 5)</a:t>
-            </a:r>
-          </a:p>
-          <a:p>
-            <a:endParaRPr lang="en-US" sz="2800" dirty="0"/>
-          </a:p>
-          <a:p>
-            <a:endParaRPr lang="en-US" sz="2800" dirty="0"/>
-          </a:p>
-        </p:txBody>
-      </p:sp>
-    </p:spTree>
-    <p:extLst>
-      <p:ext uri="{BB962C8B-B14F-4D97-AF65-F5344CB8AC3E}">
-        <p14:creationId xmlns:p14="http://schemas.microsoft.com/office/powerpoint/2010/main" val="1401816289"/>
-      </p:ext>
-    </p:extLst>
-  </p:cSld>
-  <p:clrMapOvr>
-    <a:masterClrMapping/>
-  </p:clrMapOvr>
-</p:sld>
-</file>
-
-<file path=ppt/slides/slide12.xml><?xml version="1.0" encoding="utf-8"?>
-<p:sld xmlns:a="http://schemas.openxmlformats.org/drawingml/2006/main" xmlns:r="http://schemas.openxmlformats.org/officeDocument/2006/relationships" xmlns:p="http://schemas.openxmlformats.org/presentationml/2006/main">
-  <p:cSld>
-    <p:spTree>
-      <p:nvGrpSpPr>
-        <p:cNvPr id="1" name=""/>
-        <p:cNvGrpSpPr/>
-        <p:nvPr/>
-      </p:nvGrpSpPr>
-      <p:grpSpPr>
-        <a:xfrm>
-          <a:off x="0" y="0"/>
-          <a:ext cx="0" cy="0"/>
-          <a:chOff x="0" y="0"/>
-          <a:chExt cx="0" cy="0"/>
-        </a:xfrm>
-      </p:grpSpPr>
-      <p:sp>
-        <p:nvSpPr>
-          <p:cNvPr id="2" name="Title 1">
-            <a:extLst>
-              <a:ext uri="{FF2B5EF4-FFF2-40B4-BE49-F238E27FC236}">
-                <a16:creationId xmlns:a16="http://schemas.microsoft.com/office/drawing/2014/main" id="{5D9BF388-2F3D-DF4A-AB27-7EC7C2904857}"/>
-              </a:ext>
-            </a:extLst>
-          </p:cNvPr>
-          <p:cNvSpPr>
-            <a:spLocks noGrp="1"/>
-          </p:cNvSpPr>
-          <p:nvPr>
-            <p:ph type="title"/>
-          </p:nvPr>
+            <a:pPr algn="ctr"/>
+            <a:r>
+              <a:rPr lang="en-US" sz="4000"/>
+              <a:t>Big Picture</a:t>
+            </a:r>
+            <a:endParaRPr lang="en-US" sz="4000" b="1"/>
+          </a:p>
+          <a:p>
+            <a:pPr algn="ctr"/>
+            <a:r>
+              <a:rPr lang="en-US" b="1"/>
+              <a:t>Assessment/Treatment Planning/Treatment Cycle</a:t>
+            </a:r>
+            <a:endParaRPr lang="en-US"/>
+          </a:p>
+        </p:txBody>
+      </p:sp>
+      <p:sp>
+        <p:nvSpPr>
+          <p:cNvPr id="8" name="TextBox 7"/>
+          <p:cNvSpPr txBox="1"/>
+          <p:nvPr/>
         </p:nvSpPr>
         <p:spPr>
           <a:xfrm>
-            <a:off x="2152650" y="365127"/>
-            <a:ext cx="7886700" cy="1006474"/>
-          </a:xfrm>
-        </p:spPr>
-        <p:txBody>
-          <a:bodyPr/>
-          <a:lstStyle/>
-          <a:p>
-            <a:r>
-              <a:rPr lang="en-US" dirty="0"/>
-              <a:t>Troubleshooting Therapy</a:t>
-            </a:r>
-          </a:p>
-        </p:txBody>
-      </p:sp>
-      <p:sp>
-        <p:nvSpPr>
-          <p:cNvPr id="3" name="TextBox 2">
-            <a:extLst>
-              <a:ext uri="{FF2B5EF4-FFF2-40B4-BE49-F238E27FC236}">
-                <a16:creationId xmlns:a16="http://schemas.microsoft.com/office/drawing/2014/main" id="{05A856DE-DA91-8141-8A65-C4411A48A9F5}"/>
-              </a:ext>
-            </a:extLst>
-          </p:cNvPr>
-          <p:cNvSpPr txBox="1"/>
-          <p:nvPr/>
-        </p:nvSpPr>
-        <p:spPr>
-          <a:xfrm>
-            <a:off x="1924051" y="1394916"/>
-            <a:ext cx="8218170" cy="5262979"/>
+            <a:off x="7762067" y="1801814"/>
+            <a:ext cx="2185262" cy="646331"/>
           </a:xfrm>
           <a:prstGeom prst="rect">
             <a:avLst/>
@@ -7271,118 +7103,22 @@
           <a:lstStyle/>
           <a:p>
             <a:r>
-              <a:rPr lang="en-US" sz="2800" dirty="0"/>
-              <a:t>Scenarios:</a:t>
-            </a:r>
-          </a:p>
-          <a:p>
-            <a:endParaRPr lang="en-US" sz="2800" dirty="0"/>
-          </a:p>
-          <a:p>
-            <a:r>
-              <a:rPr lang="en-US" sz="2800" dirty="0"/>
-              <a:t>When the clinician brings out the articulation stimulus cards, the client tries to leave the table.  (Group 3)</a:t>
-            </a:r>
-          </a:p>
-          <a:p>
-            <a:endParaRPr lang="en-US" sz="2800" dirty="0"/>
-          </a:p>
-          <a:p>
-            <a:r>
-              <a:rPr lang="en-US" sz="2800" dirty="0"/>
-              <a:t> When the clinician presents the stimulus pictures to the client with aphasia, she closes her eyes as if to sleep.  (Group 4)</a:t>
-            </a:r>
-          </a:p>
-          <a:p>
-            <a:endParaRPr lang="en-US" sz="2800" dirty="0"/>
-          </a:p>
-          <a:p>
-            <a:r>
-              <a:rPr lang="en-US" sz="2800" dirty="0"/>
-              <a:t>When the SLP visits the school-age AAC client’s classroom, the SGD is not charged 3 of 5 days in the week. (Group 10)</a:t>
-            </a:r>
-          </a:p>
-        </p:txBody>
-      </p:sp>
-    </p:spTree>
-    <p:extLst>
-      <p:ext uri="{BB962C8B-B14F-4D97-AF65-F5344CB8AC3E}">
-        <p14:creationId xmlns:p14="http://schemas.microsoft.com/office/powerpoint/2010/main" val="4116766854"/>
-      </p:ext>
-    </p:extLst>
-  </p:cSld>
-  <p:clrMapOvr>
-    <a:masterClrMapping/>
-  </p:clrMapOvr>
-</p:sld>
-</file>
-
-<file path=ppt/slides/slide13.xml><?xml version="1.0" encoding="utf-8"?>
-<p:sld xmlns:a="http://schemas.openxmlformats.org/drawingml/2006/main" xmlns:r="http://schemas.openxmlformats.org/officeDocument/2006/relationships" xmlns:p="http://schemas.openxmlformats.org/presentationml/2006/main">
-  <p:cSld>
-    <p:spTree>
-      <p:nvGrpSpPr>
-        <p:cNvPr id="1" name=""/>
-        <p:cNvGrpSpPr/>
-        <p:nvPr/>
-      </p:nvGrpSpPr>
-      <p:grpSpPr>
-        <a:xfrm>
-          <a:off x="0" y="0"/>
-          <a:ext cx="0" cy="0"/>
-          <a:chOff x="0" y="0"/>
-          <a:chExt cx="0" cy="0"/>
-        </a:xfrm>
-      </p:grpSpPr>
-      <p:sp>
-        <p:nvSpPr>
-          <p:cNvPr id="2" name="Title 1">
-            <a:extLst>
-              <a:ext uri="{FF2B5EF4-FFF2-40B4-BE49-F238E27FC236}">
-                <a16:creationId xmlns:a16="http://schemas.microsoft.com/office/drawing/2014/main" id="{5D9BF388-2F3D-DF4A-AB27-7EC7C2904857}"/>
-              </a:ext>
-            </a:extLst>
-          </p:cNvPr>
-          <p:cNvSpPr>
-            <a:spLocks noGrp="1"/>
-          </p:cNvSpPr>
-          <p:nvPr>
-            <p:ph type="title"/>
-          </p:nvPr>
+              <a:rPr lang="en-US"/>
+              <a:t>Referral, Intake, File Review</a:t>
+            </a:r>
+          </a:p>
+        </p:txBody>
+      </p:sp>
+      <p:sp>
+        <p:nvSpPr>
+          <p:cNvPr id="12" name="TextBox 11"/>
+          <p:cNvSpPr txBox="1"/>
+          <p:nvPr/>
         </p:nvSpPr>
         <p:spPr>
           <a:xfrm>
-            <a:off x="2152650" y="365127"/>
-            <a:ext cx="7886700" cy="1006474"/>
-          </a:xfrm>
-        </p:spPr>
-        <p:txBody>
-          <a:bodyPr/>
-          <a:lstStyle/>
-          <a:p>
-            <a:r>
-              <a:rPr lang="en-US" dirty="0"/>
-              <a:t>Troubleshooting Therapy</a:t>
-            </a:r>
-          </a:p>
-        </p:txBody>
-      </p:sp>
-      <p:sp>
-        <p:nvSpPr>
-          <p:cNvPr id="3" name="TextBox 2">
-            <a:extLst>
-              <a:ext uri="{FF2B5EF4-FFF2-40B4-BE49-F238E27FC236}">
-                <a16:creationId xmlns:a16="http://schemas.microsoft.com/office/drawing/2014/main" id="{05A856DE-DA91-8141-8A65-C4411A48A9F5}"/>
-              </a:ext>
-            </a:extLst>
-          </p:cNvPr>
-          <p:cNvSpPr txBox="1"/>
-          <p:nvPr/>
-        </p:nvSpPr>
-        <p:spPr>
-          <a:xfrm>
-            <a:off x="1924051" y="1394916"/>
-            <a:ext cx="8218170" cy="4401205"/>
+            <a:off x="5454892" y="3216606"/>
+            <a:ext cx="1751309" cy="1015663"/>
           </a:xfrm>
           <a:prstGeom prst="rect">
             <a:avLst/>
@@ -7395,119 +7131,24 @@
           </a:bodyPr>
           <a:lstStyle/>
           <a:p>
-            <a:r>
-              <a:rPr lang="en-US" sz="2800" dirty="0"/>
-              <a:t>Scenarios:</a:t>
-            </a:r>
-          </a:p>
-          <a:p>
-            <a:endParaRPr lang="en-US" sz="2800" dirty="0"/>
-          </a:p>
-          <a:p>
-            <a:r>
-              <a:rPr lang="en-US" sz="2800" dirty="0"/>
-              <a:t>The client with SSD has averaged 20% accuracy for the past 2 sessions.  (Group 5)</a:t>
-            </a:r>
-          </a:p>
-          <a:p>
-            <a:endParaRPr lang="en-US" sz="2800" dirty="0"/>
-          </a:p>
-          <a:p>
-            <a:r>
-              <a:rPr lang="en-US" sz="2800" dirty="0"/>
-              <a:t>The client with TBI has been unable to follow any 2-step directions for the past 2 sessions.  (Group 6)</a:t>
-            </a:r>
-          </a:p>
-          <a:p>
-            <a:endParaRPr lang="en-US" sz="2800" dirty="0"/>
-          </a:p>
-          <a:p>
-            <a:endParaRPr lang="en-US" sz="2800" dirty="0"/>
-          </a:p>
-          <a:p>
-            <a:endParaRPr lang="en-US" sz="2800" dirty="0"/>
-          </a:p>
-        </p:txBody>
-      </p:sp>
-    </p:spTree>
-    <p:extLst>
-      <p:ext uri="{BB962C8B-B14F-4D97-AF65-F5344CB8AC3E}">
-        <p14:creationId xmlns:p14="http://schemas.microsoft.com/office/powerpoint/2010/main" val="2801253501"/>
-      </p:ext>
-    </p:extLst>
-  </p:cSld>
-  <p:clrMapOvr>
-    <a:masterClrMapping/>
-  </p:clrMapOvr>
-</p:sld>
-</file>
-
-<file path=ppt/slides/slide14.xml><?xml version="1.0" encoding="utf-8"?>
-<p:sld xmlns:a="http://schemas.openxmlformats.org/drawingml/2006/main" xmlns:r="http://schemas.openxmlformats.org/officeDocument/2006/relationships" xmlns:p="http://schemas.openxmlformats.org/presentationml/2006/main">
-  <p:cSld>
-    <p:spTree>
-      <p:nvGrpSpPr>
-        <p:cNvPr id="1" name=""/>
-        <p:cNvGrpSpPr/>
-        <p:nvPr/>
-      </p:nvGrpSpPr>
-      <p:grpSpPr>
-        <a:xfrm>
-          <a:off x="0" y="0"/>
-          <a:ext cx="0" cy="0"/>
-          <a:chOff x="0" y="0"/>
-          <a:chExt cx="0" cy="0"/>
-        </a:xfrm>
-      </p:grpSpPr>
-      <p:sp>
-        <p:nvSpPr>
-          <p:cNvPr id="2" name="Title 1">
-            <a:extLst>
-              <a:ext uri="{FF2B5EF4-FFF2-40B4-BE49-F238E27FC236}">
-                <a16:creationId xmlns:a16="http://schemas.microsoft.com/office/drawing/2014/main" id="{5D9BF388-2F3D-DF4A-AB27-7EC7C2904857}"/>
-              </a:ext>
-            </a:extLst>
-          </p:cNvPr>
-          <p:cNvSpPr>
-            <a:spLocks noGrp="1"/>
-          </p:cNvSpPr>
-          <p:nvPr>
-            <p:ph type="title"/>
-          </p:nvPr>
+            <a:pPr algn="ctr"/>
+            <a:r>
+              <a:rPr lang="en-US" sz="2000" b="1"/>
+              <a:t>Ongoing Progress Monitoring</a:t>
+            </a:r>
+          </a:p>
+        </p:txBody>
+      </p:sp>
+      <p:sp>
+        <p:nvSpPr>
+          <p:cNvPr id="13" name="TextBox 12"/>
+          <p:cNvSpPr txBox="1"/>
+          <p:nvPr/>
         </p:nvSpPr>
         <p:spPr>
           <a:xfrm>
-            <a:off x="2152650" y="365127"/>
-            <a:ext cx="7886700" cy="1006474"/>
-          </a:xfrm>
-        </p:spPr>
-        <p:txBody>
-          <a:bodyPr/>
-          <a:lstStyle/>
-          <a:p>
-            <a:r>
-              <a:rPr lang="en-US" dirty="0"/>
-              <a:t>Troubleshooting Therapy</a:t>
-            </a:r>
-          </a:p>
-        </p:txBody>
-      </p:sp>
-      <p:sp>
-        <p:nvSpPr>
-          <p:cNvPr id="3" name="TextBox 2">
-            <a:extLst>
-              <a:ext uri="{FF2B5EF4-FFF2-40B4-BE49-F238E27FC236}">
-                <a16:creationId xmlns:a16="http://schemas.microsoft.com/office/drawing/2014/main" id="{05A856DE-DA91-8141-8A65-C4411A48A9F5}"/>
-              </a:ext>
-            </a:extLst>
-          </p:cNvPr>
-          <p:cNvSpPr txBox="1"/>
-          <p:nvPr/>
-        </p:nvSpPr>
-        <p:spPr>
-          <a:xfrm>
-            <a:off x="1924051" y="1394915"/>
-            <a:ext cx="8218170" cy="4832092"/>
+            <a:off x="8854698" y="2743201"/>
+            <a:ext cx="1518834" cy="646331"/>
           </a:xfrm>
           <a:prstGeom prst="rect">
             <a:avLst/>
@@ -7521,118 +7162,22 @@
           <a:lstStyle/>
           <a:p>
             <a:r>
-              <a:rPr lang="en-US" sz="2800" dirty="0"/>
-              <a:t>Scenarios:</a:t>
-            </a:r>
-          </a:p>
-          <a:p>
-            <a:endParaRPr lang="en-US" sz="2800" dirty="0"/>
-          </a:p>
-          <a:p>
-            <a:r>
-              <a:rPr lang="en-US" sz="2800" dirty="0"/>
-              <a:t>The client with SSD achieved 100% accuracy on all tasks for the entire session.  (Group 7)</a:t>
-            </a:r>
-          </a:p>
-          <a:p>
-            <a:endParaRPr lang="en-US" sz="2800" dirty="0"/>
-          </a:p>
-          <a:p>
-            <a:endParaRPr lang="en-US" sz="2800" dirty="0"/>
-          </a:p>
-          <a:p>
-            <a:r>
-              <a:rPr lang="en-US" sz="2800" dirty="0"/>
-              <a:t>The client with TBI completed all planned tasks perfectly within the first 30 minutes of an hour session. (Group 9)</a:t>
-            </a:r>
-          </a:p>
-          <a:p>
-            <a:endParaRPr lang="en-US" sz="2800" dirty="0"/>
-          </a:p>
-          <a:p>
-            <a:endParaRPr lang="en-US" sz="2800" dirty="0"/>
-          </a:p>
-        </p:txBody>
-      </p:sp>
-    </p:spTree>
-    <p:extLst>
-      <p:ext uri="{BB962C8B-B14F-4D97-AF65-F5344CB8AC3E}">
-        <p14:creationId xmlns:p14="http://schemas.microsoft.com/office/powerpoint/2010/main" val="205700351"/>
-      </p:ext>
-    </p:extLst>
-  </p:cSld>
-  <p:clrMapOvr>
-    <a:masterClrMapping/>
-  </p:clrMapOvr>
-</p:sld>
-</file>
-
-<file path=ppt/slides/slide15.xml><?xml version="1.0" encoding="utf-8"?>
-<p:sld xmlns:a="http://schemas.openxmlformats.org/drawingml/2006/main" xmlns:r="http://schemas.openxmlformats.org/officeDocument/2006/relationships" xmlns:p="http://schemas.openxmlformats.org/presentationml/2006/main">
-  <p:cSld>
-    <p:spTree>
-      <p:nvGrpSpPr>
-        <p:cNvPr id="1" name=""/>
-        <p:cNvGrpSpPr/>
-        <p:nvPr/>
-      </p:nvGrpSpPr>
-      <p:grpSpPr>
-        <a:xfrm>
-          <a:off x="0" y="0"/>
-          <a:ext cx="0" cy="0"/>
-          <a:chOff x="0" y="0"/>
-          <a:chExt cx="0" cy="0"/>
-        </a:xfrm>
-      </p:grpSpPr>
-      <p:sp>
-        <p:nvSpPr>
-          <p:cNvPr id="2" name="Title 1">
-            <a:extLst>
-              <a:ext uri="{FF2B5EF4-FFF2-40B4-BE49-F238E27FC236}">
-                <a16:creationId xmlns:a16="http://schemas.microsoft.com/office/drawing/2014/main" id="{5D9BF388-2F3D-DF4A-AB27-7EC7C2904857}"/>
-              </a:ext>
-            </a:extLst>
-          </p:cNvPr>
-          <p:cNvSpPr>
-            <a:spLocks noGrp="1"/>
-          </p:cNvSpPr>
-          <p:nvPr>
-            <p:ph type="title"/>
-          </p:nvPr>
+              <a:rPr lang="en-US"/>
+              <a:t>Differential Diagnosis</a:t>
+            </a:r>
+          </a:p>
+        </p:txBody>
+      </p:sp>
+      <p:sp>
+        <p:nvSpPr>
+          <p:cNvPr id="14" name="TextBox 13"/>
+          <p:cNvSpPr txBox="1"/>
+          <p:nvPr/>
         </p:nvSpPr>
         <p:spPr>
           <a:xfrm>
-            <a:off x="2152650" y="365127"/>
-            <a:ext cx="7886700" cy="1006474"/>
-          </a:xfrm>
-        </p:spPr>
-        <p:txBody>
-          <a:bodyPr/>
-          <a:lstStyle/>
-          <a:p>
-            <a:r>
-              <a:rPr lang="en-US" dirty="0"/>
-              <a:t>Troubleshooting Therapy</a:t>
-            </a:r>
-          </a:p>
-        </p:txBody>
-      </p:sp>
-      <p:sp>
-        <p:nvSpPr>
-          <p:cNvPr id="3" name="TextBox 2">
-            <a:extLst>
-              <a:ext uri="{FF2B5EF4-FFF2-40B4-BE49-F238E27FC236}">
-                <a16:creationId xmlns:a16="http://schemas.microsoft.com/office/drawing/2014/main" id="{05A856DE-DA91-8141-8A65-C4411A48A9F5}"/>
-              </a:ext>
-            </a:extLst>
-          </p:cNvPr>
-          <p:cNvSpPr txBox="1"/>
-          <p:nvPr/>
-        </p:nvSpPr>
-        <p:spPr>
-          <a:xfrm>
-            <a:off x="1924051" y="1394915"/>
-            <a:ext cx="8218170" cy="3970318"/>
+            <a:off x="3073831" y="5787758"/>
+            <a:ext cx="3279964" cy="369332"/>
           </a:xfrm>
           <a:prstGeom prst="rect">
             <a:avLst/>
@@ -7646,280 +7191,22 @@
           <a:lstStyle/>
           <a:p>
             <a:r>
-              <a:rPr lang="en-US" sz="2800" dirty="0"/>
-              <a:t>Scenarios:</a:t>
-            </a:r>
-          </a:p>
-          <a:p>
-            <a:endParaRPr lang="en-US" sz="2800" dirty="0"/>
-          </a:p>
-          <a:p>
-            <a:r>
-              <a:rPr lang="en-US" sz="2800" dirty="0"/>
-              <a:t>The preschool language client always says “no” when the clinician asks, “Can you say it one more time?” (Group 8)</a:t>
-            </a:r>
-          </a:p>
-          <a:p>
-            <a:endParaRPr lang="en-US" sz="2800" dirty="0"/>
-          </a:p>
-          <a:p>
-            <a:r>
-              <a:rPr lang="en-US" sz="2800" dirty="0"/>
-              <a:t>When presented with a picture and asked, "What do you think this person is thinking?” the adult with ASD describes what the person is doing.  (Group 9)</a:t>
-            </a:r>
-          </a:p>
-        </p:txBody>
-      </p:sp>
-    </p:spTree>
-    <p:extLst>
-      <p:ext uri="{BB962C8B-B14F-4D97-AF65-F5344CB8AC3E}">
-        <p14:creationId xmlns:p14="http://schemas.microsoft.com/office/powerpoint/2010/main" val="961199348"/>
-      </p:ext>
-    </p:extLst>
-  </p:cSld>
-  <p:clrMapOvr>
-    <a:masterClrMapping/>
-  </p:clrMapOvr>
-</p:sld>
-</file>
-
-<file path=ppt/slides/slide16.xml><?xml version="1.0" encoding="utf-8"?>
-<p:sld xmlns:a="http://schemas.openxmlformats.org/drawingml/2006/main" xmlns:r="http://schemas.openxmlformats.org/officeDocument/2006/relationships" xmlns:p="http://schemas.openxmlformats.org/presentationml/2006/main">
-  <p:cSld>
-    <p:spTree>
-      <p:nvGrpSpPr>
-        <p:cNvPr id="1" name=""/>
-        <p:cNvGrpSpPr/>
-        <p:nvPr/>
-      </p:nvGrpSpPr>
-      <p:grpSpPr>
-        <a:xfrm>
-          <a:off x="0" y="0"/>
-          <a:ext cx="0" cy="0"/>
-          <a:chOff x="0" y="0"/>
-          <a:chExt cx="0" cy="0"/>
-        </a:xfrm>
-      </p:grpSpPr>
-      <p:sp>
-        <p:nvSpPr>
-          <p:cNvPr id="2" name="Title 1">
-            <a:extLst>
-              <a:ext uri="{FF2B5EF4-FFF2-40B4-BE49-F238E27FC236}">
-                <a16:creationId xmlns:a16="http://schemas.microsoft.com/office/drawing/2014/main" id="{18304B8B-3303-5146-AB61-53291528562D}"/>
-              </a:ext>
-            </a:extLst>
-          </p:cNvPr>
-          <p:cNvSpPr>
-            <a:spLocks noGrp="1"/>
-          </p:cNvSpPr>
-          <p:nvPr>
-            <p:ph type="title"/>
-          </p:nvPr>
+              <a:rPr lang="en-US"/>
+              <a:t>Reviewing Empirical Evidence</a:t>
+            </a:r>
+          </a:p>
+        </p:txBody>
+      </p:sp>
+      <p:sp>
+        <p:nvSpPr>
+          <p:cNvPr id="15" name="TextBox 14"/>
+          <p:cNvSpPr txBox="1"/>
+          <p:nvPr/>
         </p:nvSpPr>
         <p:spPr>
           <a:xfrm>
-            <a:off x="2152650" y="1"/>
-            <a:ext cx="7886700" cy="1325563"/>
-          </a:xfrm>
-        </p:spPr>
-        <p:txBody>
-          <a:bodyPr/>
-          <a:lstStyle/>
-          <a:p>
-            <a:r>
-              <a:rPr lang="en-US" dirty="0"/>
-              <a:t>Instructional Language</a:t>
-            </a:r>
-          </a:p>
-        </p:txBody>
-      </p:sp>
-      <p:sp>
-        <p:nvSpPr>
-          <p:cNvPr id="3" name="Content Placeholder 2">
-            <a:extLst>
-              <a:ext uri="{FF2B5EF4-FFF2-40B4-BE49-F238E27FC236}">
-                <a16:creationId xmlns:a16="http://schemas.microsoft.com/office/drawing/2014/main" id="{B19E9D60-3612-7B47-A883-A00DFECE389D}"/>
-              </a:ext>
-            </a:extLst>
-          </p:cNvPr>
-          <p:cNvSpPr>
-            <a:spLocks noGrp="1"/>
-          </p:cNvSpPr>
-          <p:nvPr>
-            <p:ph idx="1"/>
-          </p:nvPr>
-        </p:nvSpPr>
-        <p:spPr>
-          <a:xfrm>
-            <a:off x="1684774" y="881542"/>
-            <a:ext cx="8354576" cy="5805637"/>
-          </a:xfrm>
-        </p:spPr>
-        <p:txBody>
-          <a:bodyPr>
-            <a:noAutofit/>
-          </a:bodyPr>
-          <a:lstStyle/>
-          <a:p>
-            <a:pPr>
-              <a:lnSpc>
-                <a:spcPct val="150000"/>
-              </a:lnSpc>
-            </a:pPr>
-            <a:r>
-              <a:rPr lang="en-US" sz="2400" dirty="0"/>
-              <a:t>Make sure client is attending before giving instruction.</a:t>
-            </a:r>
-          </a:p>
-          <a:p>
-            <a:pPr>
-              <a:lnSpc>
-                <a:spcPct val="150000"/>
-              </a:lnSpc>
-            </a:pPr>
-            <a:r>
-              <a:rPr lang="en-US" sz="2400" dirty="0"/>
-              <a:t>Use clear concise wording.  Avoid long, complicated explanations.</a:t>
-            </a:r>
-          </a:p>
-          <a:p>
-            <a:pPr>
-              <a:lnSpc>
-                <a:spcPct val="150000"/>
-              </a:lnSpc>
-            </a:pPr>
-            <a:r>
-              <a:rPr lang="en-US" sz="2400" dirty="0"/>
-              <a:t>State instruction in the declarative form.  Tell, don’t ask.</a:t>
-            </a:r>
-          </a:p>
-          <a:p>
-            <a:pPr>
-              <a:lnSpc>
-                <a:spcPct val="150000"/>
-              </a:lnSpc>
-            </a:pPr>
-            <a:r>
-              <a:rPr lang="en-US" sz="2400" dirty="0"/>
-              <a:t>Provide time for client to process instruction before repeating</a:t>
-            </a:r>
-          </a:p>
-          <a:p>
-            <a:pPr>
-              <a:lnSpc>
-                <a:spcPct val="150000"/>
-              </a:lnSpc>
-            </a:pPr>
-            <a:r>
-              <a:rPr lang="en-US" sz="2400" dirty="0"/>
-              <a:t>Determine if instruction requires scaffolding.</a:t>
-            </a:r>
-          </a:p>
-          <a:p>
-            <a:pPr>
-              <a:lnSpc>
-                <a:spcPct val="150000"/>
-              </a:lnSpc>
-            </a:pPr>
-            <a:r>
-              <a:rPr lang="en-US" sz="2400" dirty="0"/>
-              <a:t>Emphasize instructions for targeted behavior rather than details of the activity or game.  If the activity/game requires long instruction, find a different activity to practice target.  </a:t>
-            </a:r>
-          </a:p>
-          <a:p>
-            <a:pPr>
-              <a:lnSpc>
-                <a:spcPct val="150000"/>
-              </a:lnSpc>
-            </a:pPr>
-            <a:r>
-              <a:rPr lang="en-US" sz="2400" dirty="0"/>
-              <a:t>Provide specific, corrective feedback</a:t>
-            </a:r>
-          </a:p>
-        </p:txBody>
-      </p:sp>
-    </p:spTree>
-    <p:extLst>
-      <p:ext uri="{BB962C8B-B14F-4D97-AF65-F5344CB8AC3E}">
-        <p14:creationId xmlns:p14="http://schemas.microsoft.com/office/powerpoint/2010/main" val="2512091235"/>
-      </p:ext>
-    </p:extLst>
-  </p:cSld>
-  <p:clrMapOvr>
-    <a:masterClrMapping/>
-  </p:clrMapOvr>
-</p:sld>
-</file>
-
-<file path=ppt/slides/slide17.xml><?xml version="1.0" encoding="utf-8"?>
-<p:sld xmlns:a="http://schemas.openxmlformats.org/drawingml/2006/main" xmlns:r="http://schemas.openxmlformats.org/officeDocument/2006/relationships" xmlns:p="http://schemas.openxmlformats.org/presentationml/2006/main">
-  <p:cSld>
-    <p:spTree>
-      <p:nvGrpSpPr>
-        <p:cNvPr id="1" name=""/>
-        <p:cNvGrpSpPr/>
-        <p:nvPr/>
-      </p:nvGrpSpPr>
-      <p:grpSpPr>
-        <a:xfrm>
-          <a:off x="0" y="0"/>
-          <a:ext cx="0" cy="0"/>
-          <a:chOff x="0" y="0"/>
-          <a:chExt cx="0" cy="0"/>
-        </a:xfrm>
-      </p:grpSpPr>
-      <p:sp>
-        <p:nvSpPr>
-          <p:cNvPr id="2" name="Title 1">
-            <a:extLst>
-              <a:ext uri="{FF2B5EF4-FFF2-40B4-BE49-F238E27FC236}">
-                <a16:creationId xmlns:a16="http://schemas.microsoft.com/office/drawing/2014/main" id="{5D9BF388-2F3D-DF4A-AB27-7EC7C2904857}"/>
-              </a:ext>
-            </a:extLst>
-          </p:cNvPr>
-          <p:cNvSpPr>
-            <a:spLocks noGrp="1"/>
-          </p:cNvSpPr>
-          <p:nvPr>
-            <p:ph type="title"/>
-          </p:nvPr>
-        </p:nvSpPr>
-        <p:spPr>
-          <a:xfrm>
-            <a:off x="2152650" y="365127"/>
-            <a:ext cx="7886700" cy="1006474"/>
-          </a:xfrm>
-        </p:spPr>
-        <p:txBody>
-          <a:bodyPr>
-            <a:normAutofit fontScale="90000"/>
-          </a:bodyPr>
-          <a:lstStyle/>
-          <a:p>
-            <a:r>
-              <a:rPr lang="en-US" dirty="0"/>
-              <a:t>Troubleshooting Therapy (Group 10)</a:t>
-            </a:r>
-          </a:p>
-        </p:txBody>
-      </p:sp>
-      <p:sp>
-        <p:nvSpPr>
-          <p:cNvPr id="3" name="TextBox 2">
-            <a:extLst>
-              <a:ext uri="{FF2B5EF4-FFF2-40B4-BE49-F238E27FC236}">
-                <a16:creationId xmlns:a16="http://schemas.microsoft.com/office/drawing/2014/main" id="{05A856DE-DA91-8141-8A65-C4411A48A9F5}"/>
-              </a:ext>
-            </a:extLst>
-          </p:cNvPr>
-          <p:cNvSpPr txBox="1"/>
-          <p:nvPr/>
-        </p:nvSpPr>
-        <p:spPr>
-          <a:xfrm>
-            <a:off x="1924051" y="1394916"/>
-            <a:ext cx="8218170" cy="5262979"/>
+            <a:off x="8498237" y="3471621"/>
+            <a:ext cx="1596326" cy="646331"/>
           </a:xfrm>
           <a:prstGeom prst="rect">
             <a:avLst/>
@@ -7933,115 +7220,22 @@
           <a:lstStyle/>
           <a:p>
             <a:r>
-              <a:rPr lang="en-US" sz="2800" dirty="0"/>
-              <a:t>Scenarios:</a:t>
-            </a:r>
-          </a:p>
-          <a:p>
-            <a:endParaRPr lang="en-US" sz="2800" dirty="0"/>
-          </a:p>
-          <a:p>
-            <a:r>
-              <a:rPr lang="en-US" sz="2800" dirty="0"/>
-              <a:t>Only 2 of 4 treatment objectives were completed during the session, because the client loved playing with Legos as a reinforcer.  (Group 10)</a:t>
-            </a:r>
-          </a:p>
-          <a:p>
-            <a:endParaRPr lang="en-US" sz="2800" dirty="0"/>
-          </a:p>
-          <a:p>
-            <a:endParaRPr lang="en-US" sz="2800" dirty="0"/>
-          </a:p>
-          <a:p>
-            <a:r>
-              <a:rPr lang="en-US" sz="2800" dirty="0"/>
-              <a:t>During a 30-minute session, the client watched a 20-minute video and afterwards discussed the characters’ feelings. The clinician says they will discuss the characters’ thoughts during the next session.  (Group 8)</a:t>
-            </a:r>
-          </a:p>
-          <a:p>
-            <a:endParaRPr lang="en-US" sz="2800" dirty="0"/>
-          </a:p>
-        </p:txBody>
-      </p:sp>
-    </p:spTree>
-    <p:extLst>
-      <p:ext uri="{BB962C8B-B14F-4D97-AF65-F5344CB8AC3E}">
-        <p14:creationId xmlns:p14="http://schemas.microsoft.com/office/powerpoint/2010/main" val="3845533113"/>
-      </p:ext>
-    </p:extLst>
-  </p:cSld>
-  <p:clrMapOvr>
-    <a:masterClrMapping/>
-  </p:clrMapOvr>
-</p:sld>
-</file>
-
-<file path=ppt/slides/slide18.xml><?xml version="1.0" encoding="utf-8"?>
-<p:sld xmlns:a="http://schemas.openxmlformats.org/drawingml/2006/main" xmlns:r="http://schemas.openxmlformats.org/officeDocument/2006/relationships" xmlns:p="http://schemas.openxmlformats.org/presentationml/2006/main">
-  <p:cSld>
-    <p:spTree>
-      <p:nvGrpSpPr>
-        <p:cNvPr id="1" name=""/>
-        <p:cNvGrpSpPr/>
-        <p:nvPr/>
-      </p:nvGrpSpPr>
-      <p:grpSpPr>
-        <a:xfrm>
-          <a:off x="0" y="0"/>
-          <a:ext cx="0" cy="0"/>
-          <a:chOff x="0" y="0"/>
-          <a:chExt cx="0" cy="0"/>
-        </a:xfrm>
-      </p:grpSpPr>
-      <p:sp>
-        <p:nvSpPr>
-          <p:cNvPr id="2" name="Title 1">
-            <a:extLst>
-              <a:ext uri="{FF2B5EF4-FFF2-40B4-BE49-F238E27FC236}">
-                <a16:creationId xmlns:a16="http://schemas.microsoft.com/office/drawing/2014/main" id="{5D9BF388-2F3D-DF4A-AB27-7EC7C2904857}"/>
-              </a:ext>
-            </a:extLst>
-          </p:cNvPr>
-          <p:cNvSpPr>
-            <a:spLocks noGrp="1"/>
-          </p:cNvSpPr>
-          <p:nvPr>
-            <p:ph type="title"/>
-          </p:nvPr>
+              <a:rPr lang="en-US"/>
+              <a:t>Programmatic Evidence</a:t>
+            </a:r>
+          </a:p>
+        </p:txBody>
+      </p:sp>
+      <p:sp>
+        <p:nvSpPr>
+          <p:cNvPr id="16" name="TextBox 15"/>
+          <p:cNvSpPr txBox="1"/>
+          <p:nvPr/>
         </p:nvSpPr>
         <p:spPr>
           <a:xfrm>
-            <a:off x="2152650" y="365127"/>
-            <a:ext cx="7886700" cy="1006474"/>
-          </a:xfrm>
-        </p:spPr>
-        <p:txBody>
-          <a:bodyPr/>
-          <a:lstStyle/>
-          <a:p>
-            <a:r>
-              <a:rPr lang="en-US" dirty="0"/>
-              <a:t>Troubleshooting Therapy</a:t>
-            </a:r>
-          </a:p>
-        </p:txBody>
-      </p:sp>
-      <p:sp>
-        <p:nvSpPr>
-          <p:cNvPr id="3" name="TextBox 2">
-            <a:extLst>
-              <a:ext uri="{FF2B5EF4-FFF2-40B4-BE49-F238E27FC236}">
-                <a16:creationId xmlns:a16="http://schemas.microsoft.com/office/drawing/2014/main" id="{05A856DE-DA91-8141-8A65-C4411A48A9F5}"/>
-              </a:ext>
-            </a:extLst>
-          </p:cNvPr>
-          <p:cNvSpPr txBox="1"/>
-          <p:nvPr/>
-        </p:nvSpPr>
-        <p:spPr>
-          <a:xfrm>
-            <a:off x="1924051" y="1394915"/>
-            <a:ext cx="8218170" cy="3970318"/>
+            <a:off x="6576447" y="5787758"/>
+            <a:ext cx="3518116" cy="369332"/>
           </a:xfrm>
           <a:prstGeom prst="rect">
             <a:avLst/>
@@ -8055,112 +7249,22 @@
           <a:lstStyle/>
           <a:p>
             <a:r>
-              <a:rPr lang="en-US" sz="2800" dirty="0"/>
-              <a:t>Scenarios:</a:t>
-            </a:r>
-          </a:p>
-          <a:p>
-            <a:endParaRPr lang="en-US" sz="2800" dirty="0"/>
-          </a:p>
-          <a:p>
-            <a:r>
-              <a:rPr lang="en-US" sz="2800" dirty="0"/>
-              <a:t>During a school-age language group, Melanie answers every question while Ryan remains very quiet. (Group 7)</a:t>
-            </a:r>
-          </a:p>
-          <a:p>
-            <a:endParaRPr lang="en-US" sz="2800" dirty="0"/>
-          </a:p>
-          <a:p>
-            <a:endParaRPr lang="en-US" sz="2800" dirty="0"/>
-          </a:p>
-          <a:p>
-            <a:r>
-              <a:rPr lang="en-US" sz="2800" dirty="0"/>
-              <a:t>During a Parkinson’s support group, one member talks over and interrupts other members.  (Group 6)</a:t>
-            </a:r>
-          </a:p>
-        </p:txBody>
-      </p:sp>
-    </p:spTree>
-    <p:extLst>
-      <p:ext uri="{BB962C8B-B14F-4D97-AF65-F5344CB8AC3E}">
-        <p14:creationId xmlns:p14="http://schemas.microsoft.com/office/powerpoint/2010/main" val="2426264747"/>
-      </p:ext>
-    </p:extLst>
-  </p:cSld>
-  <p:clrMapOvr>
-    <a:masterClrMapping/>
-  </p:clrMapOvr>
-</p:sld>
-</file>
-
-<file path=ppt/slides/slide19.xml><?xml version="1.0" encoding="utf-8"?>
-<p:sld xmlns:a="http://schemas.openxmlformats.org/drawingml/2006/main" xmlns:r="http://schemas.openxmlformats.org/officeDocument/2006/relationships" xmlns:p="http://schemas.openxmlformats.org/presentationml/2006/main">
-  <p:cSld>
-    <p:spTree>
-      <p:nvGrpSpPr>
-        <p:cNvPr id="1" name=""/>
-        <p:cNvGrpSpPr/>
-        <p:nvPr/>
-      </p:nvGrpSpPr>
-      <p:grpSpPr>
-        <a:xfrm>
-          <a:off x="0" y="0"/>
-          <a:ext cx="0" cy="0"/>
-          <a:chOff x="0" y="0"/>
-          <a:chExt cx="0" cy="0"/>
-        </a:xfrm>
-      </p:grpSpPr>
-      <p:sp>
-        <p:nvSpPr>
-          <p:cNvPr id="2" name="Title 1">
-            <a:extLst>
-              <a:ext uri="{FF2B5EF4-FFF2-40B4-BE49-F238E27FC236}">
-                <a16:creationId xmlns:a16="http://schemas.microsoft.com/office/drawing/2014/main" id="{5D9BF388-2F3D-DF4A-AB27-7EC7C2904857}"/>
-              </a:ext>
-            </a:extLst>
-          </p:cNvPr>
-          <p:cNvSpPr>
-            <a:spLocks noGrp="1"/>
-          </p:cNvSpPr>
-          <p:nvPr>
-            <p:ph type="title"/>
-          </p:nvPr>
+              <a:rPr lang="en-US"/>
+              <a:t>Selecting a Treatment Approach</a:t>
+            </a:r>
+          </a:p>
+        </p:txBody>
+      </p:sp>
+      <p:sp>
+        <p:nvSpPr>
+          <p:cNvPr id="17" name="TextBox 16"/>
+          <p:cNvSpPr txBox="1"/>
+          <p:nvPr/>
         </p:nvSpPr>
         <p:spPr>
           <a:xfrm>
-            <a:off x="2152650" y="365127"/>
-            <a:ext cx="7886700" cy="1006474"/>
-          </a:xfrm>
-        </p:spPr>
-        <p:txBody>
-          <a:bodyPr/>
-          <a:lstStyle/>
-          <a:p>
-            <a:r>
-              <a:rPr lang="en-US" dirty="0"/>
-              <a:t>Troubleshooting Therapy</a:t>
-            </a:r>
-          </a:p>
-        </p:txBody>
-      </p:sp>
-      <p:sp>
-        <p:nvSpPr>
-          <p:cNvPr id="3" name="TextBox 2">
-            <a:extLst>
-              <a:ext uri="{FF2B5EF4-FFF2-40B4-BE49-F238E27FC236}">
-                <a16:creationId xmlns:a16="http://schemas.microsoft.com/office/drawing/2014/main" id="{05A856DE-DA91-8141-8A65-C4411A48A9F5}"/>
-              </a:ext>
-            </a:extLst>
-          </p:cNvPr>
-          <p:cNvSpPr txBox="1"/>
-          <p:nvPr/>
-        </p:nvSpPr>
-        <p:spPr>
-          <a:xfrm>
-            <a:off x="1924051" y="1394915"/>
-            <a:ext cx="8218170" cy="4832092"/>
+            <a:off x="3585275" y="6110924"/>
+            <a:ext cx="2991173" cy="646331"/>
           </a:xfrm>
           <a:prstGeom prst="rect">
             <a:avLst/>
@@ -8174,29 +7278,124 @@
           <a:lstStyle/>
           <a:p>
             <a:r>
-              <a:rPr lang="en-US" sz="2800" dirty="0"/>
-              <a:t>Scenarios:</a:t>
-            </a:r>
-          </a:p>
-          <a:p>
-            <a:endParaRPr lang="en-US" sz="2800" dirty="0"/>
-          </a:p>
-          <a:p>
-            <a:r>
-              <a:rPr lang="en-US" sz="2800" dirty="0"/>
-              <a:t>The teenager with Down Syndrome refuses to use his communication device at home, but will use it when required at school. (Group 1)</a:t>
-            </a:r>
-          </a:p>
-          <a:p>
-            <a:endParaRPr lang="en-US" sz="2800" dirty="0"/>
-          </a:p>
-          <a:p>
-            <a:endParaRPr lang="en-US" sz="2800" dirty="0"/>
-          </a:p>
-          <a:p>
-            <a:r>
-              <a:rPr lang="en-US" sz="2800" dirty="0"/>
-              <a:t>During early intervention home visits, the parent interrupts therapy with the child by initiating conversation unrelated to the child’s therapy.  (Group 2)</a:t>
+              <a:rPr lang="en-US"/>
+              <a:t>Determining Frequency, Duration, Service delivery</a:t>
+            </a:r>
+          </a:p>
+        </p:txBody>
+      </p:sp>
+      <p:sp>
+        <p:nvSpPr>
+          <p:cNvPr id="18" name="TextBox 17"/>
+          <p:cNvSpPr txBox="1"/>
+          <p:nvPr/>
+        </p:nvSpPr>
+        <p:spPr>
+          <a:xfrm>
+            <a:off x="3427455" y="1880674"/>
+            <a:ext cx="1286359" cy="646331"/>
+          </a:xfrm>
+          <a:prstGeom prst="rect">
+            <a:avLst/>
+          </a:prstGeom>
+          <a:noFill/>
+        </p:spPr>
+        <p:txBody>
+          <a:bodyPr wrap="square" rtlCol="0">
+            <a:spAutoFit/>
+          </a:bodyPr>
+          <a:lstStyle/>
+          <a:p>
+            <a:r>
+              <a:rPr lang="en-US"/>
+              <a:t>Session Planning</a:t>
+            </a:r>
+          </a:p>
+        </p:txBody>
+      </p:sp>
+      <p:sp>
+        <p:nvSpPr>
+          <p:cNvPr id="19" name="TextBox 18"/>
+          <p:cNvSpPr txBox="1"/>
+          <p:nvPr/>
+        </p:nvSpPr>
+        <p:spPr>
+          <a:xfrm>
+            <a:off x="2613025" y="2862445"/>
+            <a:ext cx="1282216" cy="646331"/>
+          </a:xfrm>
+          <a:prstGeom prst="rect">
+            <a:avLst/>
+          </a:prstGeom>
+          <a:noFill/>
+        </p:spPr>
+        <p:txBody>
+          <a:bodyPr wrap="square" rtlCol="0">
+            <a:spAutoFit/>
+          </a:bodyPr>
+          <a:lstStyle/>
+          <a:p>
+            <a:r>
+              <a:rPr lang="en-US"/>
+              <a:t>Data Collection</a:t>
+            </a:r>
+          </a:p>
+        </p:txBody>
+      </p:sp>
+      <p:sp>
+        <p:nvSpPr>
+          <p:cNvPr id="21" name="TextBox 20"/>
+          <p:cNvSpPr txBox="1"/>
+          <p:nvPr/>
+        </p:nvSpPr>
+        <p:spPr>
+          <a:xfrm>
+            <a:off x="6576448" y="6276814"/>
+            <a:ext cx="2882685" cy="369332"/>
+          </a:xfrm>
+          <a:prstGeom prst="rect">
+            <a:avLst/>
+          </a:prstGeom>
+          <a:noFill/>
+        </p:spPr>
+        <p:txBody>
+          <a:bodyPr wrap="square" rtlCol="0">
+            <a:spAutoFit/>
+          </a:bodyPr>
+          <a:lstStyle/>
+          <a:p>
+            <a:r>
+              <a:rPr lang="en-US"/>
+              <a:t>Goal Selection</a:t>
+            </a:r>
+          </a:p>
+        </p:txBody>
+      </p:sp>
+      <p:sp>
+        <p:nvSpPr>
+          <p:cNvPr id="20" name="TextBox 19"/>
+          <p:cNvSpPr txBox="1"/>
+          <p:nvPr/>
+        </p:nvSpPr>
+        <p:spPr>
+          <a:xfrm>
+            <a:off x="2543629" y="4001295"/>
+            <a:ext cx="1355486" cy="830997"/>
+          </a:xfrm>
+          <a:prstGeom prst="rect">
+            <a:avLst/>
+          </a:prstGeom>
+          <a:noFill/>
+        </p:spPr>
+        <p:txBody>
+          <a:bodyPr wrap="square" rtlCol="0">
+            <a:spAutoFit/>
+          </a:bodyPr>
+          <a:lstStyle/>
+          <a:p>
+            <a:r>
+              <a:rPr lang="en-US" sz="1600"/>
+              <a:t>Service Delivery, Referral</a:t>
             </a:r>
           </a:p>
         </p:txBody>
@@ -8204,7 +7403,7 @@
     </p:spTree>
     <p:extLst>
       <p:ext uri="{BB962C8B-B14F-4D97-AF65-F5344CB8AC3E}">
-        <p14:creationId xmlns:p14="http://schemas.microsoft.com/office/powerpoint/2010/main" val="2423387848"/>
+        <p14:creationId xmlns:p14="http://schemas.microsoft.com/office/powerpoint/2010/main" val="852719293"/>
       </p:ext>
     </p:extLst>
   </p:cSld>
@@ -8798,732 +7997,6 @@
 </p:sld>
 </file>
 
-<file path=ppt/slides/slide20.xml><?xml version="1.0" encoding="utf-8"?>
-<p:sld xmlns:a="http://schemas.openxmlformats.org/drawingml/2006/main" xmlns:r="http://schemas.openxmlformats.org/officeDocument/2006/relationships" xmlns:p="http://schemas.openxmlformats.org/presentationml/2006/main">
-  <p:cSld>
-    <p:spTree>
-      <p:nvGrpSpPr>
-        <p:cNvPr id="1" name=""/>
-        <p:cNvGrpSpPr/>
-        <p:nvPr/>
-      </p:nvGrpSpPr>
-      <p:grpSpPr>
-        <a:xfrm>
-          <a:off x="0" y="0"/>
-          <a:ext cx="0" cy="0"/>
-          <a:chOff x="0" y="0"/>
-          <a:chExt cx="0" cy="0"/>
-        </a:xfrm>
-      </p:grpSpPr>
-      <p:sp>
-        <p:nvSpPr>
-          <p:cNvPr id="2" name="Title 1">
-            <a:extLst>
-              <a:ext uri="{FF2B5EF4-FFF2-40B4-BE49-F238E27FC236}">
-                <a16:creationId xmlns:a16="http://schemas.microsoft.com/office/drawing/2014/main" id="{5D9BF388-2F3D-DF4A-AB27-7EC7C2904857}"/>
-              </a:ext>
-            </a:extLst>
-          </p:cNvPr>
-          <p:cNvSpPr>
-            <a:spLocks noGrp="1"/>
-          </p:cNvSpPr>
-          <p:nvPr>
-            <p:ph type="title"/>
-          </p:nvPr>
-        </p:nvSpPr>
-        <p:spPr>
-          <a:xfrm>
-            <a:off x="2152650" y="365127"/>
-            <a:ext cx="7886700" cy="1006474"/>
-          </a:xfrm>
-        </p:spPr>
-        <p:txBody>
-          <a:bodyPr/>
-          <a:lstStyle/>
-          <a:p>
-            <a:r>
-              <a:rPr lang="en-US" dirty="0"/>
-              <a:t>Troubleshooting Therapy</a:t>
-            </a:r>
-          </a:p>
-        </p:txBody>
-      </p:sp>
-      <p:sp>
-        <p:nvSpPr>
-          <p:cNvPr id="3" name="TextBox 2">
-            <a:extLst>
-              <a:ext uri="{FF2B5EF4-FFF2-40B4-BE49-F238E27FC236}">
-                <a16:creationId xmlns:a16="http://schemas.microsoft.com/office/drawing/2014/main" id="{05A856DE-DA91-8141-8A65-C4411A48A9F5}"/>
-              </a:ext>
-            </a:extLst>
-          </p:cNvPr>
-          <p:cNvSpPr txBox="1"/>
-          <p:nvPr/>
-        </p:nvSpPr>
-        <p:spPr>
-          <a:xfrm>
-            <a:off x="1986915" y="1201321"/>
-            <a:ext cx="8218170" cy="5262979"/>
-          </a:xfrm>
-          <a:prstGeom prst="rect">
-            <a:avLst/>
-          </a:prstGeom>
-          <a:noFill/>
-        </p:spPr>
-        <p:txBody>
-          <a:bodyPr wrap="square" rtlCol="0">
-            <a:spAutoFit/>
-          </a:bodyPr>
-          <a:lstStyle/>
-          <a:p>
-            <a:r>
-              <a:rPr lang="en-US" sz="2800" dirty="0"/>
-              <a:t>Scenarios:</a:t>
-            </a:r>
-          </a:p>
-          <a:p>
-            <a:endParaRPr lang="en-US" sz="2800" dirty="0"/>
-          </a:p>
-          <a:p>
-            <a:r>
-              <a:rPr lang="en-US" sz="2800" dirty="0"/>
-              <a:t>The client working on the /r/ sound makes progress during each session, but regresses between sessions. The beginning 10 minutes of each session is spent re-establishing /r/ before work can proceed in words. (Group 3 )</a:t>
-            </a:r>
-          </a:p>
-          <a:p>
-            <a:endParaRPr lang="en-US" sz="2800" dirty="0"/>
-          </a:p>
-          <a:p>
-            <a:r>
-              <a:rPr lang="en-US" sz="2800" dirty="0"/>
-              <a:t>During home visits, the adult client can warm-up frozen foods in the microwave with clinician prompts, but hasn’t been able to do this when the home health nurse visits. (Group 4 )</a:t>
-            </a:r>
-          </a:p>
-        </p:txBody>
-      </p:sp>
-    </p:spTree>
-    <p:extLst>
-      <p:ext uri="{BB962C8B-B14F-4D97-AF65-F5344CB8AC3E}">
-        <p14:creationId xmlns:p14="http://schemas.microsoft.com/office/powerpoint/2010/main" val="3445581660"/>
-      </p:ext>
-    </p:extLst>
-  </p:cSld>
-  <p:clrMapOvr>
-    <a:masterClrMapping/>
-  </p:clrMapOvr>
-</p:sld>
-</file>
-
-<file path=ppt/slides/slide21.xml><?xml version="1.0" encoding="utf-8"?>
-<p:sld xmlns:a="http://schemas.openxmlformats.org/drawingml/2006/main" xmlns:r="http://schemas.openxmlformats.org/officeDocument/2006/relationships" xmlns:p="http://schemas.openxmlformats.org/presentationml/2006/main">
-  <p:cSld>
-    <p:spTree>
-      <p:nvGrpSpPr>
-        <p:cNvPr id="1" name=""/>
-        <p:cNvGrpSpPr/>
-        <p:nvPr/>
-      </p:nvGrpSpPr>
-      <p:grpSpPr>
-        <a:xfrm>
-          <a:off x="0" y="0"/>
-          <a:ext cx="0" cy="0"/>
-          <a:chOff x="0" y="0"/>
-          <a:chExt cx="0" cy="0"/>
-        </a:xfrm>
-      </p:grpSpPr>
-      <p:sp>
-        <p:nvSpPr>
-          <p:cNvPr id="2" name="Title 1">
-            <a:extLst>
-              <a:ext uri="{FF2B5EF4-FFF2-40B4-BE49-F238E27FC236}">
-                <a16:creationId xmlns:a16="http://schemas.microsoft.com/office/drawing/2014/main" id="{AEF46171-66FE-9B40-9B31-9678F6129C82}"/>
-              </a:ext>
-            </a:extLst>
-          </p:cNvPr>
-          <p:cNvSpPr>
-            <a:spLocks noGrp="1"/>
-          </p:cNvSpPr>
-          <p:nvPr>
-            <p:ph type="title"/>
-          </p:nvPr>
-        </p:nvSpPr>
-        <p:spPr/>
-        <p:txBody>
-          <a:bodyPr/>
-          <a:lstStyle/>
-          <a:p>
-            <a:r>
-              <a:rPr lang="en-US" dirty="0"/>
-              <a:t>WHAT MATTERS IN THERAPY?</a:t>
-            </a:r>
-          </a:p>
-        </p:txBody>
-      </p:sp>
-      <p:sp>
-        <p:nvSpPr>
-          <p:cNvPr id="3" name="Content Placeholder 2">
-            <a:extLst>
-              <a:ext uri="{FF2B5EF4-FFF2-40B4-BE49-F238E27FC236}">
-                <a16:creationId xmlns:a16="http://schemas.microsoft.com/office/drawing/2014/main" id="{B402E7D0-538B-4448-B0A2-716637C63E0E}"/>
-              </a:ext>
-            </a:extLst>
-          </p:cNvPr>
-          <p:cNvSpPr>
-            <a:spLocks noGrp="1"/>
-          </p:cNvSpPr>
-          <p:nvPr>
-            <p:ph idx="1"/>
-          </p:nvPr>
-        </p:nvSpPr>
-        <p:spPr>
-          <a:xfrm>
-            <a:off x="2152650" y="1463885"/>
-            <a:ext cx="7886700" cy="5117785"/>
-          </a:xfrm>
-        </p:spPr>
-        <p:txBody>
-          <a:bodyPr>
-            <a:normAutofit fontScale="92500" lnSpcReduction="20000"/>
-          </a:bodyPr>
-          <a:lstStyle/>
-          <a:p>
-            <a:pPr>
-              <a:lnSpc>
-                <a:spcPct val="150000"/>
-              </a:lnSpc>
-              <a:buFont typeface="Wingdings" pitchFamily="2" charset="2"/>
-              <a:buChar char="Ø"/>
-            </a:pPr>
-            <a:r>
-              <a:rPr lang="en-US" dirty="0"/>
-              <a:t>CLEAR EXPECTATIONS (behavior and targets)</a:t>
-            </a:r>
-          </a:p>
-          <a:p>
-            <a:pPr>
-              <a:lnSpc>
-                <a:spcPct val="150000"/>
-              </a:lnSpc>
-              <a:buFont typeface="Wingdings" pitchFamily="2" charset="2"/>
-              <a:buChar char="Ø"/>
-            </a:pPr>
-            <a:r>
-              <a:rPr lang="en-US" dirty="0"/>
-              <a:t>FUNCTIONAL, MOTIVATING TASKS</a:t>
-            </a:r>
-          </a:p>
-          <a:p>
-            <a:pPr>
-              <a:lnSpc>
-                <a:spcPct val="150000"/>
-              </a:lnSpc>
-              <a:buFont typeface="Wingdings" pitchFamily="2" charset="2"/>
-              <a:buChar char="Ø"/>
-            </a:pPr>
-            <a:r>
-              <a:rPr lang="en-US" dirty="0"/>
-              <a:t>CHALLENGING TARGETS:  not too easy, not too hard</a:t>
-            </a:r>
-          </a:p>
-          <a:p>
-            <a:pPr>
-              <a:lnSpc>
-                <a:spcPct val="150000"/>
-              </a:lnSpc>
-              <a:buFont typeface="Wingdings" pitchFamily="2" charset="2"/>
-              <a:buChar char="Ø"/>
-            </a:pPr>
-            <a:r>
-              <a:rPr lang="en-US" dirty="0"/>
-              <a:t>REINFORCERS AND REINFORCEMENT SCHEDULE</a:t>
-            </a:r>
-          </a:p>
-          <a:p>
-            <a:pPr>
-              <a:lnSpc>
-                <a:spcPct val="150000"/>
-              </a:lnSpc>
-              <a:buFont typeface="Wingdings" pitchFamily="2" charset="2"/>
-              <a:buChar char="Ø"/>
-            </a:pPr>
-            <a:r>
-              <a:rPr lang="en-US" dirty="0"/>
-              <a:t>PACING:  MINUTES MATTER</a:t>
-            </a:r>
-          </a:p>
-          <a:p>
-            <a:pPr>
-              <a:lnSpc>
-                <a:spcPct val="150000"/>
-              </a:lnSpc>
-              <a:buFont typeface="Wingdings" pitchFamily="2" charset="2"/>
-              <a:buChar char="Ø"/>
-            </a:pPr>
-            <a:r>
-              <a:rPr lang="en-US" dirty="0"/>
-              <a:t>CLEAR INSTRUCTIONAL LANGUAGE</a:t>
-            </a:r>
-          </a:p>
-          <a:p>
-            <a:pPr>
-              <a:lnSpc>
-                <a:spcPct val="150000"/>
-              </a:lnSpc>
-              <a:buFont typeface="Wingdings" pitchFamily="2" charset="2"/>
-              <a:buChar char="Ø"/>
-            </a:pPr>
-            <a:r>
-              <a:rPr lang="en-US" dirty="0"/>
-              <a:t>SPECIFIC CORRECTIVE FEEDBACK</a:t>
-            </a:r>
-          </a:p>
-          <a:p>
-            <a:pPr>
-              <a:lnSpc>
-                <a:spcPct val="150000"/>
-              </a:lnSpc>
-              <a:buFont typeface="Wingdings" pitchFamily="2" charset="2"/>
-              <a:buChar char="Ø"/>
-            </a:pPr>
-            <a:r>
-              <a:rPr lang="en-US" b="1" dirty="0">
-                <a:solidFill>
-                  <a:srgbClr val="FF40FF"/>
-                </a:solidFill>
-              </a:rPr>
-              <a:t>EMPATHY, CONNECTION, ENTHUSIASM</a:t>
-            </a:r>
-          </a:p>
-          <a:p>
-            <a:pPr marL="0" indent="0">
-              <a:buNone/>
-            </a:pPr>
-            <a:endParaRPr lang="en-US" dirty="0"/>
-          </a:p>
-        </p:txBody>
-      </p:sp>
-    </p:spTree>
-    <p:extLst>
-      <p:ext uri="{BB962C8B-B14F-4D97-AF65-F5344CB8AC3E}">
-        <p14:creationId xmlns:p14="http://schemas.microsoft.com/office/powerpoint/2010/main" val="1514819745"/>
-      </p:ext>
-    </p:extLst>
-  </p:cSld>
-  <p:clrMapOvr>
-    <a:masterClrMapping/>
-  </p:clrMapOvr>
-</p:sld>
-</file>
-
-<file path=ppt/slides/slide22.xml><?xml version="1.0" encoding="utf-8"?>
-<p:sld xmlns:a="http://schemas.openxmlformats.org/drawingml/2006/main" xmlns:r="http://schemas.openxmlformats.org/officeDocument/2006/relationships" xmlns:p="http://schemas.openxmlformats.org/presentationml/2006/main">
-  <p:cSld>
-    <p:spTree>
-      <p:nvGrpSpPr>
-        <p:cNvPr id="1" name=""/>
-        <p:cNvGrpSpPr/>
-        <p:nvPr/>
-      </p:nvGrpSpPr>
-      <p:grpSpPr>
-        <a:xfrm>
-          <a:off x="0" y="0"/>
-          <a:ext cx="0" cy="0"/>
-          <a:chOff x="0" y="0"/>
-          <a:chExt cx="0" cy="0"/>
-        </a:xfrm>
-      </p:grpSpPr>
-      <p:graphicFrame>
-        <p:nvGraphicFramePr>
-          <p:cNvPr id="6" name="Content Placeholder 5"/>
-          <p:cNvGraphicFramePr>
-            <a:graphicFrameLocks noGrp="1"/>
-          </p:cNvGraphicFramePr>
-          <p:nvPr>
-            <p:ph idx="1"/>
-          </p:nvPr>
-        </p:nvGraphicFramePr>
-        <p:xfrm>
-          <a:off x="2152650" y="1825625"/>
-          <a:ext cx="7886700" cy="4351338"/>
-        </p:xfrm>
-        <a:graphic>
-          <a:graphicData uri="http://schemas.openxmlformats.org/drawingml/2006/diagram">
-            <dgm:relIds xmlns:dgm="http://schemas.openxmlformats.org/drawingml/2006/diagram" xmlns:r="http://schemas.openxmlformats.org/officeDocument/2006/relationships" r:dm="rId2" r:lo="rId3" r:qs="rId4" r:cs="rId5"/>
-          </a:graphicData>
-        </a:graphic>
-      </p:graphicFrame>
-      <p:sp>
-        <p:nvSpPr>
-          <p:cNvPr id="7" name="TextBox 6"/>
-          <p:cNvSpPr txBox="1"/>
-          <p:nvPr/>
-        </p:nvSpPr>
-        <p:spPr>
-          <a:xfrm>
-            <a:off x="2613025" y="356462"/>
-            <a:ext cx="7481538" cy="984885"/>
-          </a:xfrm>
-          <a:prstGeom prst="rect">
-            <a:avLst/>
-          </a:prstGeom>
-          <a:noFill/>
-        </p:spPr>
-        <p:txBody>
-          <a:bodyPr wrap="square" rtlCol="0">
-            <a:spAutoFit/>
-          </a:bodyPr>
-          <a:lstStyle/>
-          <a:p>
-            <a:pPr algn="ctr"/>
-            <a:r>
-              <a:rPr lang="en-US" sz="4000"/>
-              <a:t>Big Picture</a:t>
-            </a:r>
-            <a:endParaRPr lang="en-US" sz="4000" b="1"/>
-          </a:p>
-          <a:p>
-            <a:pPr algn="ctr"/>
-            <a:r>
-              <a:rPr lang="en-US" b="1"/>
-              <a:t>Assessment/Treatment Planning/Treatment Cycle</a:t>
-            </a:r>
-            <a:endParaRPr lang="en-US"/>
-          </a:p>
-        </p:txBody>
-      </p:sp>
-      <p:sp>
-        <p:nvSpPr>
-          <p:cNvPr id="8" name="TextBox 7"/>
-          <p:cNvSpPr txBox="1"/>
-          <p:nvPr/>
-        </p:nvSpPr>
-        <p:spPr>
-          <a:xfrm>
-            <a:off x="7762067" y="1801814"/>
-            <a:ext cx="2185262" cy="646331"/>
-          </a:xfrm>
-          <a:prstGeom prst="rect">
-            <a:avLst/>
-          </a:prstGeom>
-          <a:noFill/>
-        </p:spPr>
-        <p:txBody>
-          <a:bodyPr wrap="square" rtlCol="0">
-            <a:spAutoFit/>
-          </a:bodyPr>
-          <a:lstStyle/>
-          <a:p>
-            <a:r>
-              <a:rPr lang="en-US"/>
-              <a:t>Referral, Intake, File Review</a:t>
-            </a:r>
-          </a:p>
-        </p:txBody>
-      </p:sp>
-      <p:sp>
-        <p:nvSpPr>
-          <p:cNvPr id="12" name="TextBox 11"/>
-          <p:cNvSpPr txBox="1"/>
-          <p:nvPr/>
-        </p:nvSpPr>
-        <p:spPr>
-          <a:xfrm>
-            <a:off x="5454892" y="3216606"/>
-            <a:ext cx="1751309" cy="1015663"/>
-          </a:xfrm>
-          <a:prstGeom prst="rect">
-            <a:avLst/>
-          </a:prstGeom>
-          <a:noFill/>
-        </p:spPr>
-        <p:txBody>
-          <a:bodyPr wrap="square" rtlCol="0">
-            <a:spAutoFit/>
-          </a:bodyPr>
-          <a:lstStyle/>
-          <a:p>
-            <a:pPr algn="ctr"/>
-            <a:r>
-              <a:rPr lang="en-US" sz="2000" b="1"/>
-              <a:t>Ongoing Progress Monitoring</a:t>
-            </a:r>
-          </a:p>
-        </p:txBody>
-      </p:sp>
-      <p:sp>
-        <p:nvSpPr>
-          <p:cNvPr id="13" name="TextBox 12"/>
-          <p:cNvSpPr txBox="1"/>
-          <p:nvPr/>
-        </p:nvSpPr>
-        <p:spPr>
-          <a:xfrm>
-            <a:off x="8854698" y="2743201"/>
-            <a:ext cx="1518834" cy="646331"/>
-          </a:xfrm>
-          <a:prstGeom prst="rect">
-            <a:avLst/>
-          </a:prstGeom>
-          <a:noFill/>
-        </p:spPr>
-        <p:txBody>
-          <a:bodyPr wrap="square" rtlCol="0">
-            <a:spAutoFit/>
-          </a:bodyPr>
-          <a:lstStyle/>
-          <a:p>
-            <a:r>
-              <a:rPr lang="en-US"/>
-              <a:t>Differential Diagnosis</a:t>
-            </a:r>
-          </a:p>
-        </p:txBody>
-      </p:sp>
-      <p:sp>
-        <p:nvSpPr>
-          <p:cNvPr id="14" name="TextBox 13"/>
-          <p:cNvSpPr txBox="1"/>
-          <p:nvPr/>
-        </p:nvSpPr>
-        <p:spPr>
-          <a:xfrm>
-            <a:off x="3073831" y="5787758"/>
-            <a:ext cx="3279964" cy="369332"/>
-          </a:xfrm>
-          <a:prstGeom prst="rect">
-            <a:avLst/>
-          </a:prstGeom>
-          <a:noFill/>
-        </p:spPr>
-        <p:txBody>
-          <a:bodyPr wrap="square" rtlCol="0">
-            <a:spAutoFit/>
-          </a:bodyPr>
-          <a:lstStyle/>
-          <a:p>
-            <a:r>
-              <a:rPr lang="en-US"/>
-              <a:t>Reviewing Empirical Evidence</a:t>
-            </a:r>
-          </a:p>
-        </p:txBody>
-      </p:sp>
-      <p:sp>
-        <p:nvSpPr>
-          <p:cNvPr id="15" name="TextBox 14"/>
-          <p:cNvSpPr txBox="1"/>
-          <p:nvPr/>
-        </p:nvSpPr>
-        <p:spPr>
-          <a:xfrm>
-            <a:off x="8498237" y="3471621"/>
-            <a:ext cx="1596326" cy="646331"/>
-          </a:xfrm>
-          <a:prstGeom prst="rect">
-            <a:avLst/>
-          </a:prstGeom>
-          <a:noFill/>
-        </p:spPr>
-        <p:txBody>
-          <a:bodyPr wrap="square" rtlCol="0">
-            <a:spAutoFit/>
-          </a:bodyPr>
-          <a:lstStyle/>
-          <a:p>
-            <a:r>
-              <a:rPr lang="en-US"/>
-              <a:t>Programmatic Evidence</a:t>
-            </a:r>
-          </a:p>
-        </p:txBody>
-      </p:sp>
-      <p:sp>
-        <p:nvSpPr>
-          <p:cNvPr id="16" name="TextBox 15"/>
-          <p:cNvSpPr txBox="1"/>
-          <p:nvPr/>
-        </p:nvSpPr>
-        <p:spPr>
-          <a:xfrm>
-            <a:off x="6576447" y="5787758"/>
-            <a:ext cx="3518116" cy="369332"/>
-          </a:xfrm>
-          <a:prstGeom prst="rect">
-            <a:avLst/>
-          </a:prstGeom>
-          <a:noFill/>
-        </p:spPr>
-        <p:txBody>
-          <a:bodyPr wrap="square" rtlCol="0">
-            <a:spAutoFit/>
-          </a:bodyPr>
-          <a:lstStyle/>
-          <a:p>
-            <a:r>
-              <a:rPr lang="en-US"/>
-              <a:t>Selecting a Treatment Approach</a:t>
-            </a:r>
-          </a:p>
-        </p:txBody>
-      </p:sp>
-      <p:sp>
-        <p:nvSpPr>
-          <p:cNvPr id="17" name="TextBox 16"/>
-          <p:cNvSpPr txBox="1"/>
-          <p:nvPr/>
-        </p:nvSpPr>
-        <p:spPr>
-          <a:xfrm>
-            <a:off x="3585275" y="6110924"/>
-            <a:ext cx="2991173" cy="646331"/>
-          </a:xfrm>
-          <a:prstGeom prst="rect">
-            <a:avLst/>
-          </a:prstGeom>
-          <a:noFill/>
-        </p:spPr>
-        <p:txBody>
-          <a:bodyPr wrap="square" rtlCol="0">
-            <a:spAutoFit/>
-          </a:bodyPr>
-          <a:lstStyle/>
-          <a:p>
-            <a:r>
-              <a:rPr lang="en-US"/>
-              <a:t>Determining Frequency, Duration, Service delivery</a:t>
-            </a:r>
-          </a:p>
-        </p:txBody>
-      </p:sp>
-      <p:sp>
-        <p:nvSpPr>
-          <p:cNvPr id="18" name="TextBox 17"/>
-          <p:cNvSpPr txBox="1"/>
-          <p:nvPr/>
-        </p:nvSpPr>
-        <p:spPr>
-          <a:xfrm>
-            <a:off x="3427455" y="1880674"/>
-            <a:ext cx="1286359" cy="646331"/>
-          </a:xfrm>
-          <a:prstGeom prst="rect">
-            <a:avLst/>
-          </a:prstGeom>
-          <a:noFill/>
-        </p:spPr>
-        <p:txBody>
-          <a:bodyPr wrap="square" rtlCol="0">
-            <a:spAutoFit/>
-          </a:bodyPr>
-          <a:lstStyle/>
-          <a:p>
-            <a:r>
-              <a:rPr lang="en-US"/>
-              <a:t>Session Planning</a:t>
-            </a:r>
-          </a:p>
-        </p:txBody>
-      </p:sp>
-      <p:sp>
-        <p:nvSpPr>
-          <p:cNvPr id="19" name="TextBox 18"/>
-          <p:cNvSpPr txBox="1"/>
-          <p:nvPr/>
-        </p:nvSpPr>
-        <p:spPr>
-          <a:xfrm>
-            <a:off x="2613025" y="2862445"/>
-            <a:ext cx="1282216" cy="646331"/>
-          </a:xfrm>
-          <a:prstGeom prst="rect">
-            <a:avLst/>
-          </a:prstGeom>
-          <a:noFill/>
-        </p:spPr>
-        <p:txBody>
-          <a:bodyPr wrap="square" rtlCol="0">
-            <a:spAutoFit/>
-          </a:bodyPr>
-          <a:lstStyle/>
-          <a:p>
-            <a:r>
-              <a:rPr lang="en-US"/>
-              <a:t>Data Collection</a:t>
-            </a:r>
-          </a:p>
-        </p:txBody>
-      </p:sp>
-      <p:sp>
-        <p:nvSpPr>
-          <p:cNvPr id="21" name="TextBox 20"/>
-          <p:cNvSpPr txBox="1"/>
-          <p:nvPr/>
-        </p:nvSpPr>
-        <p:spPr>
-          <a:xfrm>
-            <a:off x="6576448" y="6276814"/>
-            <a:ext cx="2882685" cy="369332"/>
-          </a:xfrm>
-          <a:prstGeom prst="rect">
-            <a:avLst/>
-          </a:prstGeom>
-          <a:noFill/>
-        </p:spPr>
-        <p:txBody>
-          <a:bodyPr wrap="square" rtlCol="0">
-            <a:spAutoFit/>
-          </a:bodyPr>
-          <a:lstStyle/>
-          <a:p>
-            <a:r>
-              <a:rPr lang="en-US"/>
-              <a:t>Goal Selection</a:t>
-            </a:r>
-          </a:p>
-        </p:txBody>
-      </p:sp>
-      <p:sp>
-        <p:nvSpPr>
-          <p:cNvPr id="20" name="TextBox 19"/>
-          <p:cNvSpPr txBox="1"/>
-          <p:nvPr/>
-        </p:nvSpPr>
-        <p:spPr>
-          <a:xfrm>
-            <a:off x="2543629" y="4001295"/>
-            <a:ext cx="1355486" cy="830997"/>
-          </a:xfrm>
-          <a:prstGeom prst="rect">
-            <a:avLst/>
-          </a:prstGeom>
-          <a:noFill/>
-        </p:spPr>
-        <p:txBody>
-          <a:bodyPr wrap="square" rtlCol="0">
-            <a:spAutoFit/>
-          </a:bodyPr>
-          <a:lstStyle/>
-          <a:p>
-            <a:r>
-              <a:rPr lang="en-US" sz="1600"/>
-              <a:t>Service Delivery, Referral</a:t>
-            </a:r>
-          </a:p>
-        </p:txBody>
-      </p:sp>
-    </p:spTree>
-    <p:extLst>
-      <p:ext uri="{BB962C8B-B14F-4D97-AF65-F5344CB8AC3E}">
-        <p14:creationId xmlns:p14="http://schemas.microsoft.com/office/powerpoint/2010/main" val="852719293"/>
-      </p:ext>
-    </p:extLst>
-  </p:cSld>
-  <p:clrMapOvr>
-    <a:masterClrMapping/>
-  </p:clrMapOvr>
-</p:sld>
-</file>
-
 <file path=ppt/slides/slide3.xml><?xml version="1.0" encoding="utf-8"?>
 <p:sld xmlns:a="http://schemas.openxmlformats.org/drawingml/2006/main" xmlns:r="http://schemas.openxmlformats.org/officeDocument/2006/relationships" xmlns:p="http://schemas.openxmlformats.org/presentationml/2006/main">
   <p:cSld>
@@ -10409,10 +8882,11 @@
           </a:bodyPr>
           <a:lstStyle/>
           <a:p>
-            <a:pPr>
+            <a:pPr marL="0" indent="0">
               <a:lnSpc>
                 <a:spcPct val="150000"/>
               </a:lnSpc>
+              <a:buNone/>
             </a:pPr>
             <a:r>
               <a:rPr lang="en-US" sz="2400" dirty="0">
@@ -10641,17 +9115,18 @@
         </p:spPr>
         <p:txBody>
           <a:bodyPr>
-            <a:normAutofit lnSpcReduction="10000"/>
+            <a:noAutofit/>
           </a:bodyPr>
           <a:lstStyle/>
           <a:p>
-            <a:pPr>
+            <a:pPr marL="0" indent="0">
               <a:lnSpc>
                 <a:spcPct val="150000"/>
               </a:lnSpc>
+              <a:buNone/>
             </a:pPr>
             <a:r>
-              <a:rPr lang="en-US" sz="2400" dirty="0">
+              <a:rPr lang="en-US" sz="2000" dirty="0">
                 <a:latin typeface="Arial" panose="020B0604020202020204" pitchFamily="34" charset="0"/>
                 <a:cs typeface="Arial" panose="020B0604020202020204" pitchFamily="34" charset="0"/>
               </a:rPr>
@@ -10665,7 +9140,7 @@
               </a:lnSpc>
             </a:pPr>
             <a:r>
-              <a:rPr lang="en-US" sz="2100" dirty="0">
+              <a:rPr lang="en-US" sz="2000" dirty="0">
                 <a:latin typeface="Arial" panose="020B0604020202020204" pitchFamily="34" charset="0"/>
                 <a:cs typeface="Arial" panose="020B0604020202020204" pitchFamily="34" charset="0"/>
               </a:rPr>
@@ -10679,7 +9154,7 @@
               </a:lnSpc>
             </a:pPr>
             <a:r>
-              <a:rPr lang="en-US" dirty="0">
+              <a:rPr lang="en-US" sz="2000" dirty="0">
                 <a:latin typeface="Arial" panose="020B0604020202020204" pitchFamily="34" charset="0"/>
                 <a:cs typeface="Arial" panose="020B0604020202020204" pitchFamily="34" charset="0"/>
               </a:rPr>
@@ -10693,7 +9168,7 @@
               </a:lnSpc>
               <a:buNone/>
             </a:pPr>
-            <a:endParaRPr lang="en-US" dirty="0">
+            <a:endParaRPr lang="en-US" sz="2000" dirty="0">
               <a:latin typeface="Arial" panose="020B0604020202020204" pitchFamily="34" charset="0"/>
               <a:cs typeface="Arial" panose="020B0604020202020204" pitchFamily="34" charset="0"/>
             </a:endParaRPr>
@@ -10705,7 +9180,7 @@
               </a:lnSpc>
             </a:pPr>
             <a:r>
-              <a:rPr lang="en-US" dirty="0">
+              <a:rPr lang="en-US" sz="2000" dirty="0">
                 <a:latin typeface="Arial" panose="020B0604020202020204" pitchFamily="34" charset="0"/>
                 <a:cs typeface="Arial" panose="020B0604020202020204" pitchFamily="34" charset="0"/>
               </a:rPr>
@@ -10734,7 +9209,7 @@
               <a:buNone/>
             </a:pPr>
             <a:r>
-              <a:rPr lang="en-US" sz="2100" dirty="0">
+              <a:rPr lang="en-US" sz="2000" dirty="0">
                 <a:latin typeface="Arial" panose="020B0604020202020204" pitchFamily="34" charset="0"/>
                 <a:cs typeface="Arial" panose="020B0604020202020204" pitchFamily="34" charset="0"/>
               </a:rPr>
@@ -10835,23 +9310,9 @@
         </p:spPr>
         <p:txBody>
           <a:bodyPr>
-            <a:normAutofit fontScale="85000" lnSpcReduction="20000"/>
+            <a:normAutofit/>
           </a:bodyPr>
           <a:lstStyle/>
-          <a:p>
-            <a:pPr>
-              <a:lnSpc>
-                <a:spcPct val="150000"/>
-              </a:lnSpc>
-            </a:pPr>
-            <a:r>
-              <a:rPr lang="en-US" sz="2100" dirty="0">
-                <a:latin typeface="Arial" panose="020B0604020202020204" pitchFamily="34" charset="0"/>
-                <a:cs typeface="Arial" panose="020B0604020202020204" pitchFamily="34" charset="0"/>
-              </a:rPr>
-              <a:t>Last Progress Report:</a:t>
-            </a:r>
-          </a:p>
           <a:p>
             <a:pPr marL="0" indent="0">
               <a:lnSpc>
@@ -10864,7 +9325,7 @@
                 <a:latin typeface="Arial" panose="020B0604020202020204" pitchFamily="34" charset="0"/>
                 <a:cs typeface="Arial" panose="020B0604020202020204" pitchFamily="34" charset="0"/>
               </a:rPr>
-              <a:t>Decreasing Matthew’s rate of speech appeared to have the most impact on improving his intelligibility both in and out of the clinical setting.  He showed strong self-monitoring skills.  He frequently corrected both his rate and speech sound productions.</a:t>
+              <a:t>Last Progress Report:</a:t>
             </a:r>
           </a:p>
           <a:p>
@@ -10874,10 +9335,13 @@
               </a:lnSpc>
               <a:buNone/>
             </a:pPr>
-            <a:endParaRPr lang="en-US" dirty="0">
-              <a:latin typeface="Arial" panose="020B0604020202020204" pitchFamily="34" charset="0"/>
-              <a:cs typeface="Arial" panose="020B0604020202020204" pitchFamily="34" charset="0"/>
-            </a:endParaRPr>
+            <a:r>
+              <a:rPr lang="en-US" sz="2000" dirty="0">
+                <a:latin typeface="Arial" panose="020B0604020202020204" pitchFamily="34" charset="0"/>
+                <a:cs typeface="Arial" panose="020B0604020202020204" pitchFamily="34" charset="0"/>
+              </a:rPr>
+              <a:t>Decreasing Matthew’s rate of speech appeared to have the most impact on improving his intelligibility both in and out of the clinical setting.  He showed strong self-monitoring skills.  He frequently corrected both his rate and speech sound productions.</a:t>
+            </a:r>
           </a:p>
           <a:p>
             <a:pPr marL="0" indent="0">
@@ -10887,7 +9351,7 @@
               <a:buNone/>
             </a:pPr>
             <a:r>
-              <a:rPr lang="en-US" dirty="0">
+              <a:rPr lang="en-US" sz="2000" dirty="0">
                 <a:latin typeface="Arial" panose="020B0604020202020204" pitchFamily="34" charset="0"/>
                 <a:cs typeface="Arial" panose="020B0604020202020204" pitchFamily="34" charset="0"/>
               </a:rPr>
@@ -10983,14 +9447,17 @@
         </p:spPr>
         <p:txBody>
           <a:bodyPr>
-            <a:normAutofit fontScale="92500" lnSpcReduction="20000"/>
+            <a:normAutofit/>
           </a:bodyPr>
           <a:lstStyle/>
           <a:p>
             <a:pPr>
               <a:lnSpc>
-                <a:spcPct val="150000"/>
+                <a:spcPct val="100000"/>
               </a:lnSpc>
+              <a:spcBef>
+                <a:spcPts val="600"/>
+              </a:spcBef>
             </a:pPr>
             <a:r>
               <a:rPr lang="en-US" dirty="0"/>
@@ -11000,8 +9467,11 @@
           <a:p>
             <a:pPr>
               <a:lnSpc>
-                <a:spcPct val="150000"/>
+                <a:spcPct val="100000"/>
               </a:lnSpc>
+              <a:spcBef>
+                <a:spcPts val="600"/>
+              </a:spcBef>
             </a:pPr>
             <a:r>
               <a:rPr lang="en-US" dirty="0"/>
@@ -11011,8 +9481,11 @@
           <a:p>
             <a:pPr>
               <a:lnSpc>
-                <a:spcPct val="150000"/>
+                <a:spcPct val="100000"/>
               </a:lnSpc>
+              <a:spcBef>
+                <a:spcPts val="600"/>
+              </a:spcBef>
             </a:pPr>
             <a:r>
               <a:rPr lang="en-US" dirty="0"/>
@@ -11022,39 +9495,39 @@
           <a:p>
             <a:pPr>
               <a:lnSpc>
-                <a:spcPct val="150000"/>
+                <a:spcPct val="100000"/>
               </a:lnSpc>
+              <a:spcBef>
+                <a:spcPts val="600"/>
+              </a:spcBef>
             </a:pPr>
             <a:r>
               <a:rPr lang="en-US" dirty="0"/>
-              <a:t>Services can be provided or maintained by others </a:t>
-            </a:r>
-            <a:r>
-              <a:rPr lang="en-US" sz="2600" dirty="0"/>
-              <a:t>(skilled SLP services or specially designed instruction is no longer needed)</a:t>
+              <a:t>Services can be provided or maintained by others (skilled SLP services or specially designed instruction is no longer needed)</a:t>
             </a:r>
           </a:p>
           <a:p>
             <a:pPr>
               <a:lnSpc>
-                <a:spcPct val="150000"/>
+                <a:spcPct val="100000"/>
               </a:lnSpc>
+              <a:spcBef>
+                <a:spcPts val="600"/>
+              </a:spcBef>
             </a:pPr>
             <a:r>
               <a:rPr lang="en-US" dirty="0"/>
-              <a:t>Client is no longer able to pay for services. (refer to client to free services </a:t>
-            </a:r>
-            <a:r>
-              <a:rPr lang="en-US"/>
-              <a:t>if available)</a:t>
-            </a:r>
-            <a:endParaRPr lang="en-US" dirty="0"/>
+              <a:t>Client is no longer able to pay for services. (refer to client to free services if available)</a:t>
+            </a:r>
           </a:p>
           <a:p>
             <a:pPr marL="0" indent="0">
+              <a:spcBef>
+                <a:spcPts val="600"/>
+              </a:spcBef>
               <a:buNone/>
             </a:pPr>
-            <a:endParaRPr lang="en-US" dirty="0"/>
+            <a:endParaRPr lang="en-US" sz="3200" dirty="0"/>
           </a:p>
         </p:txBody>
       </p:sp>
@@ -11106,16 +9579,18 @@
         </p:nvSpPr>
         <p:spPr>
           <a:xfrm>
-            <a:off x="2152650" y="100013"/>
-            <a:ext cx="7886700" cy="1325563"/>
+            <a:off x="1422400" y="100013"/>
+            <a:ext cx="10058400" cy="1325563"/>
           </a:xfrm>
         </p:spPr>
         <p:txBody>
-          <a:bodyPr/>
+          <a:bodyPr>
+            <a:normAutofit/>
+          </a:bodyPr>
           <a:lstStyle/>
           <a:p>
             <a:r>
-              <a:rPr lang="en-US" dirty="0"/>
+              <a:rPr lang="en-US" sz="4000" dirty="0"/>
               <a:t>Dismissal Decision Making Documentation</a:t>
             </a:r>
           </a:p>
@@ -11139,13 +9614,13 @@
         </p:nvSpPr>
         <p:spPr>
           <a:xfrm>
-            <a:off x="1866900" y="1116966"/>
+            <a:off x="1663700" y="1116964"/>
             <a:ext cx="8172450" cy="5641023"/>
           </a:xfrm>
         </p:spPr>
         <p:txBody>
           <a:bodyPr>
-            <a:normAutofit lnSpcReduction="10000"/>
+            <a:normAutofit/>
           </a:bodyPr>
           <a:lstStyle/>
           <a:p>
@@ -11157,93 +9632,93 @@
           <a:p>
             <a:pPr lvl="1"/>
             <a:r>
+              <a:rPr lang="en-US" sz="2000" dirty="0"/>
+              <a:t>Duration of services:  </a:t>
+            </a:r>
+          </a:p>
+          <a:p>
+            <a:pPr lvl="2"/>
+            <a:r>
               <a:rPr lang="en-US" dirty="0"/>
-              <a:t>Duration of services:  </a:t>
+              <a:t>how long in therapy; how long on specific goals</a:t>
+            </a:r>
+          </a:p>
+          <a:p>
+            <a:pPr lvl="1"/>
+            <a:r>
+              <a:rPr lang="en-US" sz="2000" dirty="0"/>
+              <a:t>Intensity of services:  </a:t>
             </a:r>
           </a:p>
           <a:p>
             <a:pPr lvl="2"/>
             <a:r>
-              <a:rPr lang="en-US" sz="2400" dirty="0"/>
-              <a:t>how long in therapy; how long on specific goals</a:t>
+              <a:rPr lang="en-US" dirty="0"/>
+              <a:t>30min/</a:t>
+            </a:r>
+            <a:r>
+              <a:rPr lang="en-US" dirty="0" err="1"/>
+              <a:t>wk</a:t>
+            </a:r>
+            <a:r>
+              <a:rPr lang="en-US" dirty="0"/>
+              <a:t>; 5 min/5 days per week; 20 min/twice </a:t>
+            </a:r>
+            <a:r>
+              <a:rPr lang="en-US" dirty="0" err="1"/>
+              <a:t>wk</a:t>
+            </a:r>
+            <a:r>
+              <a:rPr lang="en-US" dirty="0"/>
+              <a:t>; etc.</a:t>
             </a:r>
           </a:p>
           <a:p>
             <a:pPr lvl="1"/>
             <a:r>
+              <a:rPr lang="en-US" sz="2000" dirty="0"/>
+              <a:t>Service Model</a:t>
+            </a:r>
+          </a:p>
+          <a:p>
+            <a:pPr lvl="2"/>
+            <a:r>
               <a:rPr lang="en-US" dirty="0"/>
-              <a:t>Intensity of services:  </a:t>
+              <a:t>Individual, group, push-in, collaboration</a:t>
+            </a:r>
+          </a:p>
+          <a:p>
+            <a:pPr lvl="1"/>
+            <a:r>
+              <a:rPr lang="en-US" sz="2000" dirty="0"/>
+              <a:t>Treatment methodology</a:t>
             </a:r>
           </a:p>
           <a:p>
             <a:pPr lvl="2"/>
             <a:r>
-              <a:rPr lang="en-US" sz="2400" dirty="0"/>
-              <a:t>30min/</a:t>
-            </a:r>
-            <a:r>
-              <a:rPr lang="en-US" sz="2400" dirty="0" err="1"/>
-              <a:t>wk</a:t>
-            </a:r>
-            <a:r>
-              <a:rPr lang="en-US" sz="2400" dirty="0"/>
-              <a:t>; 5 min/5 days per week; 20 min/twice </a:t>
-            </a:r>
-            <a:r>
-              <a:rPr lang="en-US" sz="2400" dirty="0" err="1"/>
-              <a:t>wk</a:t>
-            </a:r>
-            <a:r>
-              <a:rPr lang="en-US" sz="2400" dirty="0"/>
-              <a:t>; etc.</a:t>
+              <a:rPr lang="en-US" dirty="0"/>
+              <a:t>Describe evidence-based instructional approaches used</a:t>
             </a:r>
           </a:p>
           <a:p>
             <a:pPr lvl="1"/>
             <a:r>
+              <a:rPr lang="en-US" sz="2000" dirty="0"/>
+              <a:t>Other factors impacting progress</a:t>
+            </a:r>
+          </a:p>
+          <a:p>
+            <a:pPr lvl="2"/>
+            <a:r>
               <a:rPr lang="en-US" dirty="0"/>
-              <a:t>Service Model</a:t>
-            </a:r>
-          </a:p>
-          <a:p>
-            <a:pPr lvl="2"/>
-            <a:r>
-              <a:rPr lang="en-US" sz="2400" dirty="0"/>
-              <a:t>Individual, group, push-in, collaboration</a:t>
+              <a:t>Medical condition, attendance, homework completion</a:t>
             </a:r>
           </a:p>
           <a:p>
             <a:pPr lvl="1"/>
             <a:r>
-              <a:rPr lang="en-US" dirty="0"/>
-              <a:t>Treatment methodology</a:t>
-            </a:r>
-          </a:p>
-          <a:p>
-            <a:pPr lvl="2"/>
-            <a:r>
-              <a:rPr lang="en-US" sz="2400" dirty="0"/>
-              <a:t>Describe evidence-based instructional approaches used</a:t>
-            </a:r>
-          </a:p>
-          <a:p>
-            <a:pPr lvl="1"/>
-            <a:r>
-              <a:rPr lang="en-US" dirty="0"/>
-              <a:t>Other factors impacting progress</a:t>
-            </a:r>
-          </a:p>
-          <a:p>
-            <a:pPr lvl="2"/>
-            <a:r>
-              <a:rPr lang="en-US" sz="2400" dirty="0"/>
-              <a:t>Medical condition, attendance, homework completion</a:t>
-            </a:r>
-          </a:p>
-          <a:p>
-            <a:pPr lvl="1"/>
-            <a:r>
-              <a:rPr lang="en-US" dirty="0"/>
+              <a:rPr lang="en-US" sz="2000" dirty="0"/>
               <a:t>Client motivation</a:t>
             </a:r>
           </a:p>

</xml_diff>